<commit_message>
Prepare for Webinar #11
</commit_message>
<xml_diff>
--- a/Round2/figures/webinar.pptx
+++ b/Round2/figures/webinar.pptx
@@ -5,11 +5,13 @@
     <p:sldMasterId id="2147483648" r:id="rId1"/>
   </p:sldMasterIdLst>
   <p:notesMasterIdLst>
-    <p:notesMasterId r:id="rId4"/>
+    <p:notesMasterId r:id="rId6"/>
   </p:notesMasterIdLst>
   <p:sldIdLst>
     <p:sldId id="335" r:id="rId2"/>
     <p:sldId id="336" r:id="rId3"/>
+    <p:sldId id="337" r:id="rId4"/>
+    <p:sldId id="338" r:id="rId5"/>
   </p:sldIdLst>
   <p:sldSz cx="12192000" cy="6858000"/>
   <p:notesSz cx="6858000" cy="9144000"/>
@@ -8950,7 +8952,7 @@
           <a:p>
             <a:pPr algn="ctr"/>
             <a:r>
-              <a:rPr lang="en-HK" b="1">
+              <a:rPr lang="en-HK" b="1" dirty="0">
                 <a:solidFill>
                   <a:schemeClr val="bg1"/>
                 </a:solidFill>
@@ -8975,6 +8977,4372 @@
     <p:extLst>
       <p:ext uri="{BB962C8B-B14F-4D97-AF65-F5344CB8AC3E}">
         <p14:creationId xmlns:p14="http://schemas.microsoft.com/office/powerpoint/2010/main" val="918807467"/>
+      </p:ext>
+    </p:extLst>
+  </p:cSld>
+  <p:clrMapOvr>
+    <a:masterClrMapping/>
+  </p:clrMapOvr>
+</p:sld>
+</file>
+
+<file path=ppt/slides/slide3.xml><?xml version="1.0" encoding="utf-8"?>
+<p:sld xmlns:a="http://schemas.openxmlformats.org/drawingml/2006/main" xmlns:r="http://schemas.openxmlformats.org/officeDocument/2006/relationships" xmlns:p="http://schemas.openxmlformats.org/presentationml/2006/main">
+  <p:cSld>
+    <p:spTree>
+      <p:nvGrpSpPr>
+        <p:cNvPr id="1" name=""/>
+        <p:cNvGrpSpPr/>
+        <p:nvPr/>
+      </p:nvGrpSpPr>
+      <p:grpSpPr>
+        <a:xfrm>
+          <a:off x="0" y="0"/>
+          <a:ext cx="0" cy="0"/>
+          <a:chOff x="0" y="0"/>
+          <a:chExt cx="0" cy="0"/>
+        </a:xfrm>
+      </p:grpSpPr>
+      <p:sp>
+        <p:nvSpPr>
+          <p:cNvPr id="2" name="TextBox 1">
+            <a:extLst>
+              <a:ext uri="{FF2B5EF4-FFF2-40B4-BE49-F238E27FC236}">
+                <a16:creationId xmlns:a16="http://schemas.microsoft.com/office/drawing/2014/main" id="{F0A24B46-B288-CA48-978C-76B900D1DA63}"/>
+              </a:ext>
+            </a:extLst>
+          </p:cNvPr>
+          <p:cNvSpPr txBox="1"/>
+          <p:nvPr/>
+        </p:nvSpPr>
+        <p:spPr>
+          <a:xfrm>
+            <a:off x="1722761" y="241164"/>
+            <a:ext cx="8446926" cy="707886"/>
+          </a:xfrm>
+          <a:prstGeom prst="rect">
+            <a:avLst/>
+          </a:prstGeom>
+          <a:noFill/>
+        </p:spPr>
+        <p:txBody>
+          <a:bodyPr wrap="square" rtlCol="0">
+            <a:spAutoFit/>
+          </a:bodyPr>
+          <a:lstStyle/>
+          <a:p>
+            <a:pPr algn="ctr"/>
+            <a:r>
+              <a:rPr lang="en-US" sz="4000" dirty="0">
+                <a:solidFill>
+                  <a:schemeClr val="accent1">
+                    <a:lumMod val="60000"/>
+                    <a:lumOff val="40000"/>
+                  </a:schemeClr>
+                </a:solidFill>
+              </a:rPr>
+              <a:t>Goroutine GPM model</a:t>
+            </a:r>
+          </a:p>
+        </p:txBody>
+      </p:sp>
+      <p:sp>
+        <p:nvSpPr>
+          <p:cNvPr id="13" name="Rounded Rectangle 12">
+            <a:extLst>
+              <a:ext uri="{FF2B5EF4-FFF2-40B4-BE49-F238E27FC236}">
+                <a16:creationId xmlns:a16="http://schemas.microsoft.com/office/drawing/2014/main" id="{6A400730-096B-B244-B64F-1946B257916D}"/>
+              </a:ext>
+            </a:extLst>
+          </p:cNvPr>
+          <p:cNvSpPr/>
+          <p:nvPr/>
+        </p:nvSpPr>
+        <p:spPr>
+          <a:xfrm>
+            <a:off x="3944020" y="5067247"/>
+            <a:ext cx="4114800" cy="841703"/>
+          </a:xfrm>
+          <a:prstGeom prst="roundRect">
+            <a:avLst/>
+          </a:prstGeom>
+          <a:solidFill>
+            <a:srgbClr val="00B0F0"/>
+          </a:solidFill>
+          <a:ln>
+            <a:solidFill>
+              <a:srgbClr val="00B0F0"/>
+            </a:solidFill>
+          </a:ln>
+        </p:spPr>
+        <p:style>
+          <a:lnRef idx="2">
+            <a:schemeClr val="accent1">
+              <a:shade val="50000"/>
+            </a:schemeClr>
+          </a:lnRef>
+          <a:fillRef idx="1">
+            <a:schemeClr val="accent1"/>
+          </a:fillRef>
+          <a:effectRef idx="0">
+            <a:schemeClr val="accent1"/>
+          </a:effectRef>
+          <a:fontRef idx="minor">
+            <a:schemeClr val="lt1"/>
+          </a:fontRef>
+        </p:style>
+        <p:txBody>
+          <a:bodyPr rtlCol="0" anchor="ctr"/>
+          <a:lstStyle/>
+          <a:p>
+            <a:pPr algn="ctr"/>
+            <a:endParaRPr lang="en-US" b="1" dirty="0">
+              <a:solidFill>
+                <a:schemeClr val="bg1"/>
+              </a:solidFill>
+            </a:endParaRPr>
+          </a:p>
+        </p:txBody>
+      </p:sp>
+      <p:sp>
+        <p:nvSpPr>
+          <p:cNvPr id="18" name="Rectangle 17">
+            <a:extLst>
+              <a:ext uri="{FF2B5EF4-FFF2-40B4-BE49-F238E27FC236}">
+                <a16:creationId xmlns:a16="http://schemas.microsoft.com/office/drawing/2014/main" id="{6A2033E2-2CBF-C240-B3F6-E5185A934164}"/>
+              </a:ext>
+            </a:extLst>
+          </p:cNvPr>
+          <p:cNvSpPr/>
+          <p:nvPr/>
+        </p:nvSpPr>
+        <p:spPr>
+          <a:xfrm>
+            <a:off x="4290847" y="6160585"/>
+            <a:ext cx="3310758" cy="515421"/>
+          </a:xfrm>
+          <a:prstGeom prst="rect">
+            <a:avLst/>
+          </a:prstGeom>
+          <a:solidFill>
+            <a:schemeClr val="bg1">
+              <a:lumMod val="75000"/>
+              <a:lumOff val="25000"/>
+            </a:schemeClr>
+          </a:solidFill>
+          <a:ln>
+            <a:noFill/>
+          </a:ln>
+        </p:spPr>
+        <p:style>
+          <a:lnRef idx="2">
+            <a:schemeClr val="accent1">
+              <a:shade val="50000"/>
+            </a:schemeClr>
+          </a:lnRef>
+          <a:fillRef idx="1">
+            <a:schemeClr val="accent1"/>
+          </a:fillRef>
+          <a:effectRef idx="0">
+            <a:schemeClr val="accent1"/>
+          </a:effectRef>
+          <a:fontRef idx="minor">
+            <a:schemeClr val="lt1"/>
+          </a:fontRef>
+        </p:style>
+        <p:txBody>
+          <a:bodyPr rtlCol="0" anchor="ctr"/>
+          <a:lstStyle/>
+          <a:p>
+            <a:pPr algn="ctr"/>
+            <a:endParaRPr lang="en-US" dirty="0"/>
+          </a:p>
+          <a:p>
+            <a:pPr algn="ctr"/>
+            <a:endParaRPr lang="en-US" dirty="0"/>
+          </a:p>
+          <a:p>
+            <a:pPr algn="ctr"/>
+            <a:endParaRPr lang="en-US" dirty="0"/>
+          </a:p>
+          <a:p>
+            <a:pPr algn="ctr"/>
+            <a:r>
+              <a:rPr lang="en-US" dirty="0"/>
+              <a:t>HW Resources</a:t>
+            </a:r>
+          </a:p>
+          <a:p>
+            <a:pPr algn="ctr"/>
+            <a:endParaRPr lang="en-US" dirty="0"/>
+          </a:p>
+          <a:p>
+            <a:pPr algn="ctr"/>
+            <a:endParaRPr lang="en-US" dirty="0"/>
+          </a:p>
+        </p:txBody>
+      </p:sp>
+      <p:sp>
+        <p:nvSpPr>
+          <p:cNvPr id="20" name="Rectangle 19">
+            <a:extLst>
+              <a:ext uri="{FF2B5EF4-FFF2-40B4-BE49-F238E27FC236}">
+                <a16:creationId xmlns:a16="http://schemas.microsoft.com/office/drawing/2014/main" id="{5B941260-844B-4245-B414-9F773E40BF05}"/>
+              </a:ext>
+            </a:extLst>
+          </p:cNvPr>
+          <p:cNvSpPr/>
+          <p:nvPr/>
+        </p:nvSpPr>
+        <p:spPr>
+          <a:xfrm>
+            <a:off x="2777384" y="5134155"/>
+            <a:ext cx="1166636" cy="707886"/>
+          </a:xfrm>
+          <a:prstGeom prst="rect">
+            <a:avLst/>
+          </a:prstGeom>
+          <a:solidFill>
+            <a:srgbClr val="00B0F0"/>
+          </a:solidFill>
+        </p:spPr>
+        <p:style>
+          <a:lnRef idx="2">
+            <a:schemeClr val="accent1">
+              <a:shade val="50000"/>
+            </a:schemeClr>
+          </a:lnRef>
+          <a:fillRef idx="1">
+            <a:schemeClr val="accent1"/>
+          </a:fillRef>
+          <a:effectRef idx="0">
+            <a:schemeClr val="accent1"/>
+          </a:effectRef>
+          <a:fontRef idx="minor">
+            <a:schemeClr val="lt1"/>
+          </a:fontRef>
+        </p:style>
+        <p:txBody>
+          <a:bodyPr rtlCol="0" anchor="ctr"/>
+          <a:lstStyle/>
+          <a:p>
+            <a:pPr algn="ctr"/>
+            <a:r>
+              <a:rPr lang="en-US" sz="1400" b="1" dirty="0">
+                <a:solidFill>
+                  <a:schemeClr val="bg1"/>
+                </a:solidFill>
+              </a:rPr>
+              <a:t>Kernel Space</a:t>
+            </a:r>
+          </a:p>
+          <a:p>
+            <a:pPr algn="ctr"/>
+            <a:r>
+              <a:rPr lang="en-US" sz="1000" dirty="0">
+                <a:solidFill>
+                  <a:schemeClr val="bg1"/>
+                </a:solidFill>
+              </a:rPr>
+              <a:t>Shared page tables</a:t>
+            </a:r>
+          </a:p>
+        </p:txBody>
+      </p:sp>
+      <p:sp>
+        <p:nvSpPr>
+          <p:cNvPr id="22" name="Rounded Rectangle 21">
+            <a:extLst>
+              <a:ext uri="{FF2B5EF4-FFF2-40B4-BE49-F238E27FC236}">
+                <a16:creationId xmlns:a16="http://schemas.microsoft.com/office/drawing/2014/main" id="{90106C9A-4E2F-D94B-BF26-8C2A7AF2F164}"/>
+              </a:ext>
+            </a:extLst>
+          </p:cNvPr>
+          <p:cNvSpPr/>
+          <p:nvPr/>
+        </p:nvSpPr>
+        <p:spPr>
+          <a:xfrm>
+            <a:off x="3915117" y="2174194"/>
+            <a:ext cx="4083267" cy="2410304"/>
+          </a:xfrm>
+          <a:prstGeom prst="roundRect">
+            <a:avLst/>
+          </a:prstGeom>
+          <a:solidFill>
+            <a:schemeClr val="accent2"/>
+          </a:solidFill>
+          <a:ln>
+            <a:noFill/>
+          </a:ln>
+        </p:spPr>
+        <p:style>
+          <a:lnRef idx="2">
+            <a:schemeClr val="accent1">
+              <a:shade val="50000"/>
+            </a:schemeClr>
+          </a:lnRef>
+          <a:fillRef idx="1">
+            <a:schemeClr val="accent1"/>
+          </a:fillRef>
+          <a:effectRef idx="0">
+            <a:schemeClr val="accent1"/>
+          </a:effectRef>
+          <a:fontRef idx="minor">
+            <a:schemeClr val="lt1"/>
+          </a:fontRef>
+        </p:style>
+        <p:txBody>
+          <a:bodyPr rtlCol="0" anchor="ctr"/>
+          <a:lstStyle/>
+          <a:p>
+            <a:pPr algn="ctr"/>
+            <a:endParaRPr lang="en-US" dirty="0"/>
+          </a:p>
+        </p:txBody>
+      </p:sp>
+      <p:sp>
+        <p:nvSpPr>
+          <p:cNvPr id="30" name="Down Arrow 29">
+            <a:extLst>
+              <a:ext uri="{FF2B5EF4-FFF2-40B4-BE49-F238E27FC236}">
+                <a16:creationId xmlns:a16="http://schemas.microsoft.com/office/drawing/2014/main" id="{C19CFB82-A17D-324E-8F89-8A2743D11BCA}"/>
+              </a:ext>
+            </a:extLst>
+          </p:cNvPr>
+          <p:cNvSpPr/>
+          <p:nvPr/>
+        </p:nvSpPr>
+        <p:spPr>
+          <a:xfrm>
+            <a:off x="5856897" y="4591953"/>
+            <a:ext cx="231228" cy="469503"/>
+          </a:xfrm>
+          <a:prstGeom prst="downArrow">
+            <a:avLst/>
+          </a:prstGeom>
+          <a:solidFill>
+            <a:schemeClr val="accent2"/>
+          </a:solidFill>
+          <a:ln>
+            <a:noFill/>
+          </a:ln>
+        </p:spPr>
+        <p:style>
+          <a:lnRef idx="2">
+            <a:schemeClr val="accent1">
+              <a:shade val="50000"/>
+            </a:schemeClr>
+          </a:lnRef>
+          <a:fillRef idx="1">
+            <a:schemeClr val="accent1"/>
+          </a:fillRef>
+          <a:effectRef idx="0">
+            <a:schemeClr val="accent1"/>
+          </a:effectRef>
+          <a:fontRef idx="minor">
+            <a:schemeClr val="lt1"/>
+          </a:fontRef>
+        </p:style>
+        <p:txBody>
+          <a:bodyPr rtlCol="0" anchor="ctr"/>
+          <a:lstStyle/>
+          <a:p>
+            <a:pPr algn="ctr"/>
+            <a:endParaRPr lang="en-US">
+              <a:solidFill>
+                <a:schemeClr val="accent2">
+                  <a:lumMod val="75000"/>
+                </a:schemeClr>
+              </a:solidFill>
+            </a:endParaRPr>
+          </a:p>
+        </p:txBody>
+      </p:sp>
+      <p:sp>
+        <p:nvSpPr>
+          <p:cNvPr id="33" name="TextBox 32">
+            <a:extLst>
+              <a:ext uri="{FF2B5EF4-FFF2-40B4-BE49-F238E27FC236}">
+                <a16:creationId xmlns:a16="http://schemas.microsoft.com/office/drawing/2014/main" id="{DC55B05F-6E1C-8F48-A6DA-432EB6ABC332}"/>
+              </a:ext>
+            </a:extLst>
+          </p:cNvPr>
+          <p:cNvSpPr txBox="1"/>
+          <p:nvPr/>
+        </p:nvSpPr>
+        <p:spPr>
+          <a:xfrm>
+            <a:off x="5289662" y="4590291"/>
+            <a:ext cx="3173048" cy="369332"/>
+          </a:xfrm>
+          <a:prstGeom prst="rect">
+            <a:avLst/>
+          </a:prstGeom>
+          <a:noFill/>
+        </p:spPr>
+        <p:txBody>
+          <a:bodyPr wrap="none" rtlCol="0">
+            <a:spAutoFit/>
+          </a:bodyPr>
+          <a:lstStyle/>
+          <a:p>
+            <a:r>
+              <a:rPr lang="en-US" dirty="0">
+                <a:solidFill>
+                  <a:schemeClr val="accent4"/>
+                </a:solidFill>
+              </a:rPr>
+              <a:t>System call </a:t>
+            </a:r>
+            <a:r>
+              <a:rPr lang="en-US" sz="1200" dirty="0"/>
+              <a:t>fork(), clone(), read(), write()…</a:t>
+            </a:r>
+            <a:endParaRPr lang="en-US" dirty="0"/>
+          </a:p>
+        </p:txBody>
+      </p:sp>
+      <p:sp>
+        <p:nvSpPr>
+          <p:cNvPr id="42" name="Rounded Rectangle 41">
+            <a:extLst>
+              <a:ext uri="{FF2B5EF4-FFF2-40B4-BE49-F238E27FC236}">
+                <a16:creationId xmlns:a16="http://schemas.microsoft.com/office/drawing/2014/main" id="{6527B15E-BA5C-BC43-88BF-4A27E68D889B}"/>
+              </a:ext>
+            </a:extLst>
+          </p:cNvPr>
+          <p:cNvSpPr/>
+          <p:nvPr/>
+        </p:nvSpPr>
+        <p:spPr>
+          <a:xfrm>
+            <a:off x="3915117" y="1111539"/>
+            <a:ext cx="4083267" cy="1024560"/>
+          </a:xfrm>
+          <a:prstGeom prst="roundRect">
+            <a:avLst/>
+          </a:prstGeom>
+          <a:solidFill>
+            <a:schemeClr val="accent2"/>
+          </a:solidFill>
+          <a:ln>
+            <a:noFill/>
+          </a:ln>
+        </p:spPr>
+        <p:style>
+          <a:lnRef idx="2">
+            <a:schemeClr val="accent1">
+              <a:shade val="50000"/>
+            </a:schemeClr>
+          </a:lnRef>
+          <a:fillRef idx="1">
+            <a:schemeClr val="accent1"/>
+          </a:fillRef>
+          <a:effectRef idx="0">
+            <a:schemeClr val="accent1"/>
+          </a:effectRef>
+          <a:fontRef idx="minor">
+            <a:schemeClr val="lt1"/>
+          </a:fontRef>
+        </p:style>
+        <p:txBody>
+          <a:bodyPr rtlCol="0" anchor="ctr"/>
+          <a:lstStyle/>
+          <a:p>
+            <a:pPr algn="ctr"/>
+            <a:endParaRPr lang="en-US" dirty="0"/>
+          </a:p>
+        </p:txBody>
+      </p:sp>
+      <p:sp>
+        <p:nvSpPr>
+          <p:cNvPr id="3" name="Rectangle 2">
+            <a:extLst>
+              <a:ext uri="{FF2B5EF4-FFF2-40B4-BE49-F238E27FC236}">
+                <a16:creationId xmlns:a16="http://schemas.microsoft.com/office/drawing/2014/main" id="{11F18F9C-CE46-8243-B979-CE4D18D2F714}"/>
+              </a:ext>
+            </a:extLst>
+          </p:cNvPr>
+          <p:cNvSpPr/>
+          <p:nvPr/>
+        </p:nvSpPr>
+        <p:spPr>
+          <a:xfrm>
+            <a:off x="4780537" y="1128886"/>
+            <a:ext cx="2294582" cy="288927"/>
+          </a:xfrm>
+          <a:prstGeom prst="rect">
+            <a:avLst/>
+          </a:prstGeom>
+          <a:solidFill>
+            <a:schemeClr val="accent2"/>
+          </a:solidFill>
+          <a:ln>
+            <a:solidFill>
+              <a:schemeClr val="bg1"/>
+            </a:solidFill>
+          </a:ln>
+        </p:spPr>
+        <p:style>
+          <a:lnRef idx="2">
+            <a:schemeClr val="accent1">
+              <a:shade val="50000"/>
+            </a:schemeClr>
+          </a:lnRef>
+          <a:fillRef idx="1">
+            <a:schemeClr val="accent1"/>
+          </a:fillRef>
+          <a:effectRef idx="0">
+            <a:schemeClr val="accent1"/>
+          </a:effectRef>
+          <a:fontRef idx="minor">
+            <a:schemeClr val="lt1"/>
+          </a:fontRef>
+        </p:style>
+        <p:txBody>
+          <a:bodyPr rtlCol="0" anchor="ctr"/>
+          <a:lstStyle/>
+          <a:p>
+            <a:pPr algn="ctr"/>
+            <a:r>
+              <a:rPr lang="en-US" dirty="0"/>
+              <a:t>Go Program</a:t>
+            </a:r>
+          </a:p>
+        </p:txBody>
+      </p:sp>
+      <p:cxnSp>
+        <p:nvCxnSpPr>
+          <p:cNvPr id="45" name="Straight Connector 44">
+            <a:extLst>
+              <a:ext uri="{FF2B5EF4-FFF2-40B4-BE49-F238E27FC236}">
+                <a16:creationId xmlns:a16="http://schemas.microsoft.com/office/drawing/2014/main" id="{4601C09D-B1B3-5547-9AD3-2655EEB437DD}"/>
+              </a:ext>
+            </a:extLst>
+          </p:cNvPr>
+          <p:cNvCxnSpPr>
+            <a:cxnSpLocks/>
+          </p:cNvCxnSpPr>
+          <p:nvPr/>
+        </p:nvCxnSpPr>
+        <p:spPr>
+          <a:xfrm flipH="1">
+            <a:off x="3384628" y="1092287"/>
+            <a:ext cx="33839" cy="3564913"/>
+          </a:xfrm>
+          <a:prstGeom prst="line">
+            <a:avLst/>
+          </a:prstGeom>
+          <a:ln w="9525" cap="flat" cmpd="sng" algn="ctr">
+            <a:solidFill>
+              <a:schemeClr val="accent2"/>
+            </a:solidFill>
+            <a:prstDash val="dash"/>
+            <a:round/>
+            <a:headEnd type="none" w="med" len="med"/>
+            <a:tailEnd type="none" w="med" len="med"/>
+          </a:ln>
+        </p:spPr>
+        <p:style>
+          <a:lnRef idx="0">
+            <a:scrgbClr r="0" g="0" b="0"/>
+          </a:lnRef>
+          <a:fillRef idx="0">
+            <a:scrgbClr r="0" g="0" b="0"/>
+          </a:fillRef>
+          <a:effectRef idx="0">
+            <a:scrgbClr r="0" g="0" b="0"/>
+          </a:effectRef>
+          <a:fontRef idx="minor">
+            <a:schemeClr val="tx1"/>
+          </a:fontRef>
+        </p:style>
+      </p:cxnSp>
+      <p:cxnSp>
+        <p:nvCxnSpPr>
+          <p:cNvPr id="49" name="Straight Connector 48">
+            <a:extLst>
+              <a:ext uri="{FF2B5EF4-FFF2-40B4-BE49-F238E27FC236}">
+                <a16:creationId xmlns:a16="http://schemas.microsoft.com/office/drawing/2014/main" id="{CE1C6BBE-0005-EA42-88B9-83C009D3C8BC}"/>
+              </a:ext>
+            </a:extLst>
+          </p:cNvPr>
+          <p:cNvCxnSpPr/>
+          <p:nvPr/>
+        </p:nvCxnSpPr>
+        <p:spPr>
+          <a:xfrm>
+            <a:off x="3404882" y="1092287"/>
+            <a:ext cx="4973999" cy="0"/>
+          </a:xfrm>
+          <a:prstGeom prst="line">
+            <a:avLst/>
+          </a:prstGeom>
+          <a:ln w="9525" cap="flat" cmpd="sng" algn="ctr">
+            <a:solidFill>
+              <a:schemeClr val="accent2"/>
+            </a:solidFill>
+            <a:prstDash val="dash"/>
+            <a:round/>
+            <a:headEnd type="none" w="med" len="med"/>
+            <a:tailEnd type="none" w="med" len="med"/>
+          </a:ln>
+        </p:spPr>
+        <p:style>
+          <a:lnRef idx="0">
+            <a:scrgbClr r="0" g="0" b="0"/>
+          </a:lnRef>
+          <a:fillRef idx="0">
+            <a:scrgbClr r="0" g="0" b="0"/>
+          </a:fillRef>
+          <a:effectRef idx="0">
+            <a:scrgbClr r="0" g="0" b="0"/>
+          </a:effectRef>
+          <a:fontRef idx="minor">
+            <a:schemeClr val="tx1"/>
+          </a:fontRef>
+        </p:style>
+      </p:cxnSp>
+      <p:cxnSp>
+        <p:nvCxnSpPr>
+          <p:cNvPr id="51" name="Straight Connector 50">
+            <a:extLst>
+              <a:ext uri="{FF2B5EF4-FFF2-40B4-BE49-F238E27FC236}">
+                <a16:creationId xmlns:a16="http://schemas.microsoft.com/office/drawing/2014/main" id="{20F39267-69CA-064A-8827-03C8FD6490B0}"/>
+              </a:ext>
+            </a:extLst>
+          </p:cNvPr>
+          <p:cNvCxnSpPr>
+            <a:cxnSpLocks/>
+          </p:cNvCxnSpPr>
+          <p:nvPr/>
+        </p:nvCxnSpPr>
+        <p:spPr>
+          <a:xfrm flipH="1">
+            <a:off x="8334701" y="1092287"/>
+            <a:ext cx="31533" cy="3498004"/>
+          </a:xfrm>
+          <a:prstGeom prst="line">
+            <a:avLst/>
+          </a:prstGeom>
+          <a:ln w="9525" cap="flat" cmpd="sng" algn="ctr">
+            <a:solidFill>
+              <a:schemeClr val="accent2"/>
+            </a:solidFill>
+            <a:prstDash val="dash"/>
+            <a:round/>
+            <a:headEnd type="none" w="med" len="med"/>
+            <a:tailEnd type="none" w="med" len="med"/>
+          </a:ln>
+        </p:spPr>
+        <p:style>
+          <a:lnRef idx="0">
+            <a:scrgbClr r="0" g="0" b="0"/>
+          </a:lnRef>
+          <a:fillRef idx="0">
+            <a:scrgbClr r="0" g="0" b="0"/>
+          </a:fillRef>
+          <a:effectRef idx="0">
+            <a:scrgbClr r="0" g="0" b="0"/>
+          </a:effectRef>
+          <a:fontRef idx="minor">
+            <a:schemeClr val="tx1"/>
+          </a:fontRef>
+        </p:style>
+      </p:cxnSp>
+      <p:cxnSp>
+        <p:nvCxnSpPr>
+          <p:cNvPr id="56" name="Straight Connector 55">
+            <a:extLst>
+              <a:ext uri="{FF2B5EF4-FFF2-40B4-BE49-F238E27FC236}">
+                <a16:creationId xmlns:a16="http://schemas.microsoft.com/office/drawing/2014/main" id="{D37B65BD-E1F4-4E4F-90B7-2E10969EC3A2}"/>
+              </a:ext>
+            </a:extLst>
+          </p:cNvPr>
+          <p:cNvCxnSpPr/>
+          <p:nvPr/>
+        </p:nvCxnSpPr>
+        <p:spPr>
+          <a:xfrm>
+            <a:off x="3360702" y="4590291"/>
+            <a:ext cx="4973999" cy="0"/>
+          </a:xfrm>
+          <a:prstGeom prst="line">
+            <a:avLst/>
+          </a:prstGeom>
+          <a:ln w="9525" cap="flat" cmpd="sng" algn="ctr">
+            <a:solidFill>
+              <a:schemeClr val="accent2"/>
+            </a:solidFill>
+            <a:prstDash val="dash"/>
+            <a:round/>
+            <a:headEnd type="none" w="med" len="med"/>
+            <a:tailEnd type="none" w="med" len="med"/>
+          </a:ln>
+        </p:spPr>
+        <p:style>
+          <a:lnRef idx="0">
+            <a:scrgbClr r="0" g="0" b="0"/>
+          </a:lnRef>
+          <a:fillRef idx="0">
+            <a:scrgbClr r="0" g="0" b="0"/>
+          </a:fillRef>
+          <a:effectRef idx="0">
+            <a:scrgbClr r="0" g="0" b="0"/>
+          </a:effectRef>
+          <a:fontRef idx="minor">
+            <a:schemeClr val="tx1"/>
+          </a:fontRef>
+        </p:style>
+      </p:cxnSp>
+      <p:sp>
+        <p:nvSpPr>
+          <p:cNvPr id="57" name="TextBox 56">
+            <a:extLst>
+              <a:ext uri="{FF2B5EF4-FFF2-40B4-BE49-F238E27FC236}">
+                <a16:creationId xmlns:a16="http://schemas.microsoft.com/office/drawing/2014/main" id="{300F93A2-FCC5-0843-B6C7-01F5DC33E3B2}"/>
+              </a:ext>
+            </a:extLst>
+          </p:cNvPr>
+          <p:cNvSpPr txBox="1"/>
+          <p:nvPr/>
+        </p:nvSpPr>
+        <p:spPr>
+          <a:xfrm>
+            <a:off x="5341783" y="807955"/>
+            <a:ext cx="1101135" cy="369332"/>
+          </a:xfrm>
+          <a:prstGeom prst="rect">
+            <a:avLst/>
+          </a:prstGeom>
+          <a:noFill/>
+        </p:spPr>
+        <p:txBody>
+          <a:bodyPr wrap="none" rtlCol="0">
+            <a:spAutoFit/>
+          </a:bodyPr>
+          <a:lstStyle/>
+          <a:p>
+            <a:r>
+              <a:rPr lang="en-US" dirty="0"/>
+              <a:t>Go Binary</a:t>
+            </a:r>
+          </a:p>
+        </p:txBody>
+      </p:sp>
+      <p:sp>
+        <p:nvSpPr>
+          <p:cNvPr id="58" name="Rectangle 57">
+            <a:extLst>
+              <a:ext uri="{FF2B5EF4-FFF2-40B4-BE49-F238E27FC236}">
+                <a16:creationId xmlns:a16="http://schemas.microsoft.com/office/drawing/2014/main" id="{375399AA-FB6E-B04D-ACD5-E6C9D5EE812B}"/>
+              </a:ext>
+            </a:extLst>
+          </p:cNvPr>
+          <p:cNvSpPr/>
+          <p:nvPr/>
+        </p:nvSpPr>
+        <p:spPr>
+          <a:xfrm>
+            <a:off x="4057272" y="1534928"/>
+            <a:ext cx="1043858" cy="177781"/>
+          </a:xfrm>
+          <a:prstGeom prst="rect">
+            <a:avLst/>
+          </a:prstGeom>
+          <a:solidFill>
+            <a:srgbClr val="FFFF00"/>
+          </a:solidFill>
+          <a:ln>
+            <a:solidFill>
+              <a:schemeClr val="bg1"/>
+            </a:solidFill>
+          </a:ln>
+        </p:spPr>
+        <p:style>
+          <a:lnRef idx="2">
+            <a:schemeClr val="accent1">
+              <a:shade val="50000"/>
+            </a:schemeClr>
+          </a:lnRef>
+          <a:fillRef idx="1">
+            <a:schemeClr val="accent1"/>
+          </a:fillRef>
+          <a:effectRef idx="0">
+            <a:schemeClr val="accent1"/>
+          </a:effectRef>
+          <a:fontRef idx="minor">
+            <a:schemeClr val="lt1"/>
+          </a:fontRef>
+        </p:style>
+        <p:txBody>
+          <a:bodyPr rtlCol="0" anchor="ctr"/>
+          <a:lstStyle/>
+          <a:p>
+            <a:pPr algn="ctr"/>
+            <a:r>
+              <a:rPr lang="en-US" sz="1200" b="1" dirty="0">
+                <a:solidFill>
+                  <a:schemeClr val="bg1"/>
+                </a:solidFill>
+              </a:rPr>
+              <a:t>go stmt</a:t>
+            </a:r>
+          </a:p>
+        </p:txBody>
+      </p:sp>
+      <p:sp>
+        <p:nvSpPr>
+          <p:cNvPr id="63" name="Rectangle 62">
+            <a:extLst>
+              <a:ext uri="{FF2B5EF4-FFF2-40B4-BE49-F238E27FC236}">
+                <a16:creationId xmlns:a16="http://schemas.microsoft.com/office/drawing/2014/main" id="{BB05E209-4E50-D34D-8553-4554160D332E}"/>
+              </a:ext>
+            </a:extLst>
+          </p:cNvPr>
+          <p:cNvSpPr/>
+          <p:nvPr/>
+        </p:nvSpPr>
+        <p:spPr>
+          <a:xfrm>
+            <a:off x="4063779" y="1793334"/>
+            <a:ext cx="1043858" cy="177781"/>
+          </a:xfrm>
+          <a:prstGeom prst="rect">
+            <a:avLst/>
+          </a:prstGeom>
+          <a:solidFill>
+            <a:srgbClr val="FFFF00"/>
+          </a:solidFill>
+          <a:ln>
+            <a:solidFill>
+              <a:schemeClr val="bg1"/>
+            </a:solidFill>
+          </a:ln>
+        </p:spPr>
+        <p:style>
+          <a:lnRef idx="2">
+            <a:schemeClr val="accent1">
+              <a:shade val="50000"/>
+            </a:schemeClr>
+          </a:lnRef>
+          <a:fillRef idx="1">
+            <a:schemeClr val="accent1"/>
+          </a:fillRef>
+          <a:effectRef idx="0">
+            <a:schemeClr val="accent1"/>
+          </a:effectRef>
+          <a:fontRef idx="minor">
+            <a:schemeClr val="lt1"/>
+          </a:fontRef>
+        </p:style>
+        <p:txBody>
+          <a:bodyPr rtlCol="0" anchor="ctr"/>
+          <a:lstStyle/>
+          <a:p>
+            <a:pPr algn="ctr"/>
+            <a:r>
+              <a:rPr lang="en-US" sz="1200" b="1" dirty="0">
+                <a:solidFill>
+                  <a:schemeClr val="bg1"/>
+                </a:solidFill>
+              </a:rPr>
+              <a:t>go stmt</a:t>
+            </a:r>
+          </a:p>
+        </p:txBody>
+      </p:sp>
+      <p:sp>
+        <p:nvSpPr>
+          <p:cNvPr id="64" name="Rectangle 63">
+            <a:extLst>
+              <a:ext uri="{FF2B5EF4-FFF2-40B4-BE49-F238E27FC236}">
+                <a16:creationId xmlns:a16="http://schemas.microsoft.com/office/drawing/2014/main" id="{E16308B1-5B1F-1443-9D34-C2A0C1CCEF4C}"/>
+              </a:ext>
+            </a:extLst>
+          </p:cNvPr>
+          <p:cNvSpPr/>
+          <p:nvPr/>
+        </p:nvSpPr>
+        <p:spPr>
+          <a:xfrm>
+            <a:off x="5244271" y="1540104"/>
+            <a:ext cx="1043858" cy="177781"/>
+          </a:xfrm>
+          <a:prstGeom prst="rect">
+            <a:avLst/>
+          </a:prstGeom>
+          <a:solidFill>
+            <a:srgbClr val="FFFF00"/>
+          </a:solidFill>
+          <a:ln>
+            <a:solidFill>
+              <a:schemeClr val="bg1"/>
+            </a:solidFill>
+          </a:ln>
+        </p:spPr>
+        <p:style>
+          <a:lnRef idx="2">
+            <a:schemeClr val="accent1">
+              <a:shade val="50000"/>
+            </a:schemeClr>
+          </a:lnRef>
+          <a:fillRef idx="1">
+            <a:schemeClr val="accent1"/>
+          </a:fillRef>
+          <a:effectRef idx="0">
+            <a:schemeClr val="accent1"/>
+          </a:effectRef>
+          <a:fontRef idx="minor">
+            <a:schemeClr val="lt1"/>
+          </a:fontRef>
+        </p:style>
+        <p:txBody>
+          <a:bodyPr rtlCol="0" anchor="ctr"/>
+          <a:lstStyle/>
+          <a:p>
+            <a:pPr algn="ctr"/>
+            <a:r>
+              <a:rPr lang="en-US" sz="1200" b="1" dirty="0">
+                <a:solidFill>
+                  <a:schemeClr val="bg1"/>
+                </a:solidFill>
+              </a:rPr>
+              <a:t>go stmt</a:t>
+            </a:r>
+          </a:p>
+        </p:txBody>
+      </p:sp>
+      <p:sp>
+        <p:nvSpPr>
+          <p:cNvPr id="65" name="Rectangle 64">
+            <a:extLst>
+              <a:ext uri="{FF2B5EF4-FFF2-40B4-BE49-F238E27FC236}">
+                <a16:creationId xmlns:a16="http://schemas.microsoft.com/office/drawing/2014/main" id="{328D8346-7AD0-D843-9110-4C67FCB7B297}"/>
+              </a:ext>
+            </a:extLst>
+          </p:cNvPr>
+          <p:cNvSpPr/>
+          <p:nvPr/>
+        </p:nvSpPr>
+        <p:spPr>
+          <a:xfrm>
+            <a:off x="5244271" y="1798689"/>
+            <a:ext cx="1043858" cy="177781"/>
+          </a:xfrm>
+          <a:prstGeom prst="rect">
+            <a:avLst/>
+          </a:prstGeom>
+          <a:solidFill>
+            <a:srgbClr val="FFFF00"/>
+          </a:solidFill>
+          <a:ln>
+            <a:solidFill>
+              <a:schemeClr val="bg1"/>
+            </a:solidFill>
+          </a:ln>
+        </p:spPr>
+        <p:style>
+          <a:lnRef idx="2">
+            <a:schemeClr val="accent1">
+              <a:shade val="50000"/>
+            </a:schemeClr>
+          </a:lnRef>
+          <a:fillRef idx="1">
+            <a:schemeClr val="accent1"/>
+          </a:fillRef>
+          <a:effectRef idx="0">
+            <a:schemeClr val="accent1"/>
+          </a:effectRef>
+          <a:fontRef idx="minor">
+            <a:schemeClr val="lt1"/>
+          </a:fontRef>
+        </p:style>
+        <p:txBody>
+          <a:bodyPr rtlCol="0" anchor="ctr"/>
+          <a:lstStyle/>
+          <a:p>
+            <a:pPr algn="ctr"/>
+            <a:r>
+              <a:rPr lang="en-US" sz="1200" b="1" dirty="0">
+                <a:solidFill>
+                  <a:schemeClr val="bg1"/>
+                </a:solidFill>
+              </a:rPr>
+              <a:t>go stmt</a:t>
+            </a:r>
+          </a:p>
+        </p:txBody>
+      </p:sp>
+      <p:sp>
+        <p:nvSpPr>
+          <p:cNvPr id="66" name="TextBox 65">
+            <a:extLst>
+              <a:ext uri="{FF2B5EF4-FFF2-40B4-BE49-F238E27FC236}">
+                <a16:creationId xmlns:a16="http://schemas.microsoft.com/office/drawing/2014/main" id="{0D5AE9CE-126F-9145-84DA-6ED49BD0A2B1}"/>
+              </a:ext>
+            </a:extLst>
+          </p:cNvPr>
+          <p:cNvSpPr txBox="1"/>
+          <p:nvPr/>
+        </p:nvSpPr>
+        <p:spPr>
+          <a:xfrm>
+            <a:off x="6279017" y="1506179"/>
+            <a:ext cx="348172" cy="369332"/>
+          </a:xfrm>
+          <a:prstGeom prst="rect">
+            <a:avLst/>
+          </a:prstGeom>
+          <a:noFill/>
+        </p:spPr>
+        <p:txBody>
+          <a:bodyPr wrap="none" rtlCol="0">
+            <a:spAutoFit/>
+          </a:bodyPr>
+          <a:lstStyle/>
+          <a:p>
+            <a:r>
+              <a:rPr lang="en-US" b="1" dirty="0">
+                <a:solidFill>
+                  <a:schemeClr val="bg1"/>
+                </a:solidFill>
+              </a:rPr>
+              <a:t>…</a:t>
+            </a:r>
+          </a:p>
+        </p:txBody>
+      </p:sp>
+      <p:sp>
+        <p:nvSpPr>
+          <p:cNvPr id="67" name="Rectangle 66">
+            <a:extLst>
+              <a:ext uri="{FF2B5EF4-FFF2-40B4-BE49-F238E27FC236}">
+                <a16:creationId xmlns:a16="http://schemas.microsoft.com/office/drawing/2014/main" id="{EB3D1D5D-8144-2C4D-BAC9-92FB31D4F837}"/>
+              </a:ext>
+            </a:extLst>
+          </p:cNvPr>
+          <p:cNvSpPr/>
+          <p:nvPr/>
+        </p:nvSpPr>
+        <p:spPr>
+          <a:xfrm>
+            <a:off x="6602127" y="1534928"/>
+            <a:ext cx="1043858" cy="177781"/>
+          </a:xfrm>
+          <a:prstGeom prst="rect">
+            <a:avLst/>
+          </a:prstGeom>
+          <a:solidFill>
+            <a:srgbClr val="FFFF00"/>
+          </a:solidFill>
+          <a:ln>
+            <a:solidFill>
+              <a:schemeClr val="bg1"/>
+            </a:solidFill>
+          </a:ln>
+        </p:spPr>
+        <p:style>
+          <a:lnRef idx="2">
+            <a:schemeClr val="accent1">
+              <a:shade val="50000"/>
+            </a:schemeClr>
+          </a:lnRef>
+          <a:fillRef idx="1">
+            <a:schemeClr val="accent1"/>
+          </a:fillRef>
+          <a:effectRef idx="0">
+            <a:schemeClr val="accent1"/>
+          </a:effectRef>
+          <a:fontRef idx="minor">
+            <a:schemeClr val="lt1"/>
+          </a:fontRef>
+        </p:style>
+        <p:txBody>
+          <a:bodyPr rtlCol="0" anchor="ctr"/>
+          <a:lstStyle/>
+          <a:p>
+            <a:pPr algn="ctr"/>
+            <a:r>
+              <a:rPr lang="en-US" sz="1200" b="1" dirty="0">
+                <a:solidFill>
+                  <a:schemeClr val="bg1"/>
+                </a:solidFill>
+              </a:rPr>
+              <a:t>go stmt</a:t>
+            </a:r>
+          </a:p>
+        </p:txBody>
+      </p:sp>
+      <p:sp>
+        <p:nvSpPr>
+          <p:cNvPr id="68" name="Rectangle 67">
+            <a:extLst>
+              <a:ext uri="{FF2B5EF4-FFF2-40B4-BE49-F238E27FC236}">
+                <a16:creationId xmlns:a16="http://schemas.microsoft.com/office/drawing/2014/main" id="{B029FCC1-2F67-1048-B17F-755C256A6840}"/>
+              </a:ext>
+            </a:extLst>
+          </p:cNvPr>
+          <p:cNvSpPr/>
+          <p:nvPr/>
+        </p:nvSpPr>
+        <p:spPr>
+          <a:xfrm>
+            <a:off x="6602127" y="1797588"/>
+            <a:ext cx="1043858" cy="177781"/>
+          </a:xfrm>
+          <a:prstGeom prst="rect">
+            <a:avLst/>
+          </a:prstGeom>
+          <a:solidFill>
+            <a:srgbClr val="FFFF00"/>
+          </a:solidFill>
+          <a:ln>
+            <a:solidFill>
+              <a:schemeClr val="bg1"/>
+            </a:solidFill>
+          </a:ln>
+        </p:spPr>
+        <p:style>
+          <a:lnRef idx="2">
+            <a:schemeClr val="accent1">
+              <a:shade val="50000"/>
+            </a:schemeClr>
+          </a:lnRef>
+          <a:fillRef idx="1">
+            <a:schemeClr val="accent1"/>
+          </a:fillRef>
+          <a:effectRef idx="0">
+            <a:schemeClr val="accent1"/>
+          </a:effectRef>
+          <a:fontRef idx="minor">
+            <a:schemeClr val="lt1"/>
+          </a:fontRef>
+        </p:style>
+        <p:txBody>
+          <a:bodyPr rtlCol="0" anchor="ctr"/>
+          <a:lstStyle/>
+          <a:p>
+            <a:pPr algn="ctr"/>
+            <a:r>
+              <a:rPr lang="en-US" sz="1200" b="1" dirty="0">
+                <a:solidFill>
+                  <a:schemeClr val="bg1"/>
+                </a:solidFill>
+              </a:rPr>
+              <a:t>go stmt</a:t>
+            </a:r>
+          </a:p>
+        </p:txBody>
+      </p:sp>
+      <p:sp>
+        <p:nvSpPr>
+          <p:cNvPr id="69" name="Rectangle 68">
+            <a:extLst>
+              <a:ext uri="{FF2B5EF4-FFF2-40B4-BE49-F238E27FC236}">
+                <a16:creationId xmlns:a16="http://schemas.microsoft.com/office/drawing/2014/main" id="{1CC2B00C-18DA-D74C-BFDA-CE3D6EBCE0F5}"/>
+              </a:ext>
+            </a:extLst>
+          </p:cNvPr>
+          <p:cNvSpPr/>
+          <p:nvPr/>
+        </p:nvSpPr>
+        <p:spPr>
+          <a:xfrm>
+            <a:off x="4783171" y="2190793"/>
+            <a:ext cx="2294582" cy="288927"/>
+          </a:xfrm>
+          <a:prstGeom prst="rect">
+            <a:avLst/>
+          </a:prstGeom>
+          <a:solidFill>
+            <a:schemeClr val="accent2"/>
+          </a:solidFill>
+          <a:ln>
+            <a:solidFill>
+              <a:schemeClr val="bg1"/>
+            </a:solidFill>
+          </a:ln>
+        </p:spPr>
+        <p:style>
+          <a:lnRef idx="2">
+            <a:schemeClr val="accent1">
+              <a:shade val="50000"/>
+            </a:schemeClr>
+          </a:lnRef>
+          <a:fillRef idx="1">
+            <a:schemeClr val="accent1"/>
+          </a:fillRef>
+          <a:effectRef idx="0">
+            <a:schemeClr val="accent1"/>
+          </a:effectRef>
+          <a:fontRef idx="minor">
+            <a:schemeClr val="lt1"/>
+          </a:fontRef>
+        </p:style>
+        <p:txBody>
+          <a:bodyPr rtlCol="0" anchor="ctr"/>
+          <a:lstStyle/>
+          <a:p>
+            <a:pPr algn="ctr"/>
+            <a:r>
+              <a:rPr lang="en-US" dirty="0"/>
+              <a:t>Go Runtime</a:t>
+            </a:r>
+          </a:p>
+        </p:txBody>
+      </p:sp>
+      <p:sp>
+        <p:nvSpPr>
+          <p:cNvPr id="70" name="Rectangle 69">
+            <a:extLst>
+              <a:ext uri="{FF2B5EF4-FFF2-40B4-BE49-F238E27FC236}">
+                <a16:creationId xmlns:a16="http://schemas.microsoft.com/office/drawing/2014/main" id="{17BADD17-3C82-0142-B07D-452431922740}"/>
+              </a:ext>
+            </a:extLst>
+          </p:cNvPr>
+          <p:cNvSpPr/>
+          <p:nvPr/>
+        </p:nvSpPr>
+        <p:spPr>
+          <a:xfrm>
+            <a:off x="4527816" y="2517435"/>
+            <a:ext cx="2805291" cy="479099"/>
+          </a:xfrm>
+          <a:prstGeom prst="rect">
+            <a:avLst/>
+          </a:prstGeom>
+        </p:spPr>
+        <p:style>
+          <a:lnRef idx="2">
+            <a:schemeClr val="accent1">
+              <a:shade val="50000"/>
+            </a:schemeClr>
+          </a:lnRef>
+          <a:fillRef idx="1">
+            <a:schemeClr val="accent1"/>
+          </a:fillRef>
+          <a:effectRef idx="0">
+            <a:schemeClr val="accent1"/>
+          </a:effectRef>
+          <a:fontRef idx="minor">
+            <a:schemeClr val="lt1"/>
+          </a:fontRef>
+        </p:style>
+        <p:txBody>
+          <a:bodyPr rtlCol="0" anchor="ctr"/>
+          <a:lstStyle/>
+          <a:p>
+            <a:pPr algn="ctr"/>
+            <a:endParaRPr lang="en-US"/>
+          </a:p>
+        </p:txBody>
+      </p:sp>
+      <p:sp>
+        <p:nvSpPr>
+          <p:cNvPr id="71" name="Rectangle 70">
+            <a:extLst>
+              <a:ext uri="{FF2B5EF4-FFF2-40B4-BE49-F238E27FC236}">
+                <a16:creationId xmlns:a16="http://schemas.microsoft.com/office/drawing/2014/main" id="{398314EC-8D60-6243-B8AE-A382D97F9E20}"/>
+              </a:ext>
+            </a:extLst>
+          </p:cNvPr>
+          <p:cNvSpPr/>
+          <p:nvPr/>
+        </p:nvSpPr>
+        <p:spPr>
+          <a:xfrm>
+            <a:off x="5039365" y="2511258"/>
+            <a:ext cx="1782192" cy="170375"/>
+          </a:xfrm>
+          <a:prstGeom prst="rect">
+            <a:avLst/>
+          </a:prstGeom>
+        </p:spPr>
+        <p:style>
+          <a:lnRef idx="2">
+            <a:schemeClr val="accent1">
+              <a:shade val="50000"/>
+            </a:schemeClr>
+          </a:lnRef>
+          <a:fillRef idx="1">
+            <a:schemeClr val="accent1"/>
+          </a:fillRef>
+          <a:effectRef idx="0">
+            <a:schemeClr val="accent1"/>
+          </a:effectRef>
+          <a:fontRef idx="minor">
+            <a:schemeClr val="lt1"/>
+          </a:fontRef>
+        </p:style>
+        <p:txBody>
+          <a:bodyPr rtlCol="0" anchor="ctr"/>
+          <a:lstStyle/>
+          <a:p>
+            <a:pPr algn="ctr"/>
+            <a:r>
+              <a:rPr lang="en-US" sz="1200" dirty="0"/>
+              <a:t>Global Runnable Queue</a:t>
+            </a:r>
+          </a:p>
+        </p:txBody>
+      </p:sp>
+      <p:sp>
+        <p:nvSpPr>
+          <p:cNvPr id="72" name="Oval 71">
+            <a:extLst>
+              <a:ext uri="{FF2B5EF4-FFF2-40B4-BE49-F238E27FC236}">
+                <a16:creationId xmlns:a16="http://schemas.microsoft.com/office/drawing/2014/main" id="{2D89519E-283B-874B-A09B-309BEAEE9947}"/>
+              </a:ext>
+            </a:extLst>
+          </p:cNvPr>
+          <p:cNvSpPr/>
+          <p:nvPr/>
+        </p:nvSpPr>
+        <p:spPr>
+          <a:xfrm>
+            <a:off x="4534030" y="2658646"/>
+            <a:ext cx="357002" cy="328629"/>
+          </a:xfrm>
+          <a:prstGeom prst="ellipse">
+            <a:avLst/>
+          </a:prstGeom>
+          <a:solidFill>
+            <a:srgbClr val="FFFF00"/>
+          </a:solidFill>
+        </p:spPr>
+        <p:style>
+          <a:lnRef idx="2">
+            <a:schemeClr val="accent1">
+              <a:shade val="50000"/>
+            </a:schemeClr>
+          </a:lnRef>
+          <a:fillRef idx="1">
+            <a:schemeClr val="accent1"/>
+          </a:fillRef>
+          <a:effectRef idx="0">
+            <a:schemeClr val="accent1"/>
+          </a:effectRef>
+          <a:fontRef idx="minor">
+            <a:schemeClr val="lt1"/>
+          </a:fontRef>
+        </p:style>
+        <p:txBody>
+          <a:bodyPr rtlCol="0" anchor="ctr"/>
+          <a:lstStyle/>
+          <a:p>
+            <a:pPr algn="ctr"/>
+            <a:r>
+              <a:rPr lang="en-US" dirty="0">
+                <a:solidFill>
+                  <a:schemeClr val="bg1"/>
+                </a:solidFill>
+              </a:rPr>
+              <a:t>G</a:t>
+            </a:r>
+          </a:p>
+        </p:txBody>
+      </p:sp>
+      <p:sp>
+        <p:nvSpPr>
+          <p:cNvPr id="73" name="Oval 72">
+            <a:extLst>
+              <a:ext uri="{FF2B5EF4-FFF2-40B4-BE49-F238E27FC236}">
+                <a16:creationId xmlns:a16="http://schemas.microsoft.com/office/drawing/2014/main" id="{7F5CA3A4-2718-DA43-B203-D8ED374F177A}"/>
+              </a:ext>
+            </a:extLst>
+          </p:cNvPr>
+          <p:cNvSpPr/>
+          <p:nvPr/>
+        </p:nvSpPr>
+        <p:spPr>
+          <a:xfrm>
+            <a:off x="4925263" y="2661794"/>
+            <a:ext cx="357002" cy="328629"/>
+          </a:xfrm>
+          <a:prstGeom prst="ellipse">
+            <a:avLst/>
+          </a:prstGeom>
+          <a:solidFill>
+            <a:srgbClr val="FFFF00"/>
+          </a:solidFill>
+        </p:spPr>
+        <p:style>
+          <a:lnRef idx="2">
+            <a:schemeClr val="accent1">
+              <a:shade val="50000"/>
+            </a:schemeClr>
+          </a:lnRef>
+          <a:fillRef idx="1">
+            <a:schemeClr val="accent1"/>
+          </a:fillRef>
+          <a:effectRef idx="0">
+            <a:schemeClr val="accent1"/>
+          </a:effectRef>
+          <a:fontRef idx="minor">
+            <a:schemeClr val="lt1"/>
+          </a:fontRef>
+        </p:style>
+        <p:txBody>
+          <a:bodyPr rtlCol="0" anchor="ctr"/>
+          <a:lstStyle/>
+          <a:p>
+            <a:pPr algn="ctr"/>
+            <a:r>
+              <a:rPr lang="en-US" dirty="0">
+                <a:solidFill>
+                  <a:schemeClr val="bg1"/>
+                </a:solidFill>
+              </a:rPr>
+              <a:t>G</a:t>
+            </a:r>
+          </a:p>
+        </p:txBody>
+      </p:sp>
+      <p:sp>
+        <p:nvSpPr>
+          <p:cNvPr id="74" name="Oval 73">
+            <a:extLst>
+              <a:ext uri="{FF2B5EF4-FFF2-40B4-BE49-F238E27FC236}">
+                <a16:creationId xmlns:a16="http://schemas.microsoft.com/office/drawing/2014/main" id="{EEACFB7A-B011-6A48-B19C-4BEE82293BBD}"/>
+              </a:ext>
+            </a:extLst>
+          </p:cNvPr>
+          <p:cNvSpPr/>
+          <p:nvPr/>
+        </p:nvSpPr>
+        <p:spPr>
+          <a:xfrm>
+            <a:off x="5315316" y="2660753"/>
+            <a:ext cx="357002" cy="328629"/>
+          </a:xfrm>
+          <a:prstGeom prst="ellipse">
+            <a:avLst/>
+          </a:prstGeom>
+          <a:solidFill>
+            <a:srgbClr val="FFFF00"/>
+          </a:solidFill>
+        </p:spPr>
+        <p:style>
+          <a:lnRef idx="2">
+            <a:schemeClr val="accent1">
+              <a:shade val="50000"/>
+            </a:schemeClr>
+          </a:lnRef>
+          <a:fillRef idx="1">
+            <a:schemeClr val="accent1"/>
+          </a:fillRef>
+          <a:effectRef idx="0">
+            <a:schemeClr val="accent1"/>
+          </a:effectRef>
+          <a:fontRef idx="minor">
+            <a:schemeClr val="lt1"/>
+          </a:fontRef>
+        </p:style>
+        <p:txBody>
+          <a:bodyPr rtlCol="0" anchor="ctr"/>
+          <a:lstStyle/>
+          <a:p>
+            <a:pPr algn="ctr"/>
+            <a:r>
+              <a:rPr lang="en-US" dirty="0">
+                <a:solidFill>
+                  <a:schemeClr val="bg1"/>
+                </a:solidFill>
+              </a:rPr>
+              <a:t>G</a:t>
+            </a:r>
+          </a:p>
+        </p:txBody>
+      </p:sp>
+      <p:sp>
+        <p:nvSpPr>
+          <p:cNvPr id="75" name="TextBox 74">
+            <a:extLst>
+              <a:ext uri="{FF2B5EF4-FFF2-40B4-BE49-F238E27FC236}">
+                <a16:creationId xmlns:a16="http://schemas.microsoft.com/office/drawing/2014/main" id="{09B535AD-341F-3943-B9A4-934A22EEF300}"/>
+              </a:ext>
+            </a:extLst>
+          </p:cNvPr>
+          <p:cNvSpPr txBox="1"/>
+          <p:nvPr/>
+        </p:nvSpPr>
+        <p:spPr>
+          <a:xfrm>
+            <a:off x="6123623" y="2596445"/>
+            <a:ext cx="343364" cy="369332"/>
+          </a:xfrm>
+          <a:prstGeom prst="rect">
+            <a:avLst/>
+          </a:prstGeom>
+          <a:noFill/>
+        </p:spPr>
+        <p:txBody>
+          <a:bodyPr wrap="none" rtlCol="0">
+            <a:spAutoFit/>
+          </a:bodyPr>
+          <a:lstStyle/>
+          <a:p>
+            <a:r>
+              <a:rPr lang="en-US" dirty="0"/>
+              <a:t>…</a:t>
+            </a:r>
+          </a:p>
+        </p:txBody>
+      </p:sp>
+      <p:sp>
+        <p:nvSpPr>
+          <p:cNvPr id="79" name="Oval 78">
+            <a:extLst>
+              <a:ext uri="{FF2B5EF4-FFF2-40B4-BE49-F238E27FC236}">
+                <a16:creationId xmlns:a16="http://schemas.microsoft.com/office/drawing/2014/main" id="{E78FBE09-9AB6-1844-9EDE-456B7DA30D7C}"/>
+              </a:ext>
+            </a:extLst>
+          </p:cNvPr>
+          <p:cNvSpPr/>
+          <p:nvPr/>
+        </p:nvSpPr>
+        <p:spPr>
+          <a:xfrm>
+            <a:off x="5713380" y="2667905"/>
+            <a:ext cx="357002" cy="328629"/>
+          </a:xfrm>
+          <a:prstGeom prst="ellipse">
+            <a:avLst/>
+          </a:prstGeom>
+          <a:solidFill>
+            <a:srgbClr val="FFFF00"/>
+          </a:solidFill>
+        </p:spPr>
+        <p:style>
+          <a:lnRef idx="2">
+            <a:schemeClr val="accent1">
+              <a:shade val="50000"/>
+            </a:schemeClr>
+          </a:lnRef>
+          <a:fillRef idx="1">
+            <a:schemeClr val="accent1"/>
+          </a:fillRef>
+          <a:effectRef idx="0">
+            <a:schemeClr val="accent1"/>
+          </a:effectRef>
+          <a:fontRef idx="minor">
+            <a:schemeClr val="lt1"/>
+          </a:fontRef>
+        </p:style>
+        <p:txBody>
+          <a:bodyPr rtlCol="0" anchor="ctr"/>
+          <a:lstStyle/>
+          <a:p>
+            <a:pPr algn="ctr"/>
+            <a:r>
+              <a:rPr lang="en-US" dirty="0">
+                <a:solidFill>
+                  <a:schemeClr val="bg1"/>
+                </a:solidFill>
+              </a:rPr>
+              <a:t>G</a:t>
+            </a:r>
+          </a:p>
+        </p:txBody>
+      </p:sp>
+      <p:sp>
+        <p:nvSpPr>
+          <p:cNvPr id="80" name="Oval 79">
+            <a:extLst>
+              <a:ext uri="{FF2B5EF4-FFF2-40B4-BE49-F238E27FC236}">
+                <a16:creationId xmlns:a16="http://schemas.microsoft.com/office/drawing/2014/main" id="{E9B7A7C5-DBBC-E94D-9A23-99FDAFA64F95}"/>
+              </a:ext>
+            </a:extLst>
+          </p:cNvPr>
+          <p:cNvSpPr/>
+          <p:nvPr/>
+        </p:nvSpPr>
+        <p:spPr>
+          <a:xfrm>
+            <a:off x="6505617" y="2672333"/>
+            <a:ext cx="357002" cy="328629"/>
+          </a:xfrm>
+          <a:prstGeom prst="ellipse">
+            <a:avLst/>
+          </a:prstGeom>
+          <a:solidFill>
+            <a:srgbClr val="FFFF00"/>
+          </a:solidFill>
+        </p:spPr>
+        <p:style>
+          <a:lnRef idx="2">
+            <a:schemeClr val="accent1">
+              <a:shade val="50000"/>
+            </a:schemeClr>
+          </a:lnRef>
+          <a:fillRef idx="1">
+            <a:schemeClr val="accent1"/>
+          </a:fillRef>
+          <a:effectRef idx="0">
+            <a:schemeClr val="accent1"/>
+          </a:effectRef>
+          <a:fontRef idx="minor">
+            <a:schemeClr val="lt1"/>
+          </a:fontRef>
+        </p:style>
+        <p:txBody>
+          <a:bodyPr rtlCol="0" anchor="ctr"/>
+          <a:lstStyle/>
+          <a:p>
+            <a:pPr algn="ctr"/>
+            <a:r>
+              <a:rPr lang="en-US" dirty="0">
+                <a:solidFill>
+                  <a:schemeClr val="bg1"/>
+                </a:solidFill>
+              </a:rPr>
+              <a:t>G</a:t>
+            </a:r>
+          </a:p>
+        </p:txBody>
+      </p:sp>
+      <p:sp>
+        <p:nvSpPr>
+          <p:cNvPr id="81" name="Oval 80">
+            <a:extLst>
+              <a:ext uri="{FF2B5EF4-FFF2-40B4-BE49-F238E27FC236}">
+                <a16:creationId xmlns:a16="http://schemas.microsoft.com/office/drawing/2014/main" id="{D211FDEF-2F1C-444D-AEE5-706EAA2F4FF2}"/>
+              </a:ext>
+            </a:extLst>
+          </p:cNvPr>
+          <p:cNvSpPr/>
+          <p:nvPr/>
+        </p:nvSpPr>
+        <p:spPr>
+          <a:xfrm>
+            <a:off x="6903468" y="2674682"/>
+            <a:ext cx="357002" cy="328629"/>
+          </a:xfrm>
+          <a:prstGeom prst="ellipse">
+            <a:avLst/>
+          </a:prstGeom>
+          <a:solidFill>
+            <a:srgbClr val="FFFF00"/>
+          </a:solidFill>
+        </p:spPr>
+        <p:style>
+          <a:lnRef idx="2">
+            <a:schemeClr val="accent1">
+              <a:shade val="50000"/>
+            </a:schemeClr>
+          </a:lnRef>
+          <a:fillRef idx="1">
+            <a:schemeClr val="accent1"/>
+          </a:fillRef>
+          <a:effectRef idx="0">
+            <a:schemeClr val="accent1"/>
+          </a:effectRef>
+          <a:fontRef idx="minor">
+            <a:schemeClr val="lt1"/>
+          </a:fontRef>
+        </p:style>
+        <p:txBody>
+          <a:bodyPr rtlCol="0" anchor="ctr"/>
+          <a:lstStyle/>
+          <a:p>
+            <a:pPr algn="ctr"/>
+            <a:r>
+              <a:rPr lang="en-US" dirty="0">
+                <a:solidFill>
+                  <a:schemeClr val="bg1"/>
+                </a:solidFill>
+              </a:rPr>
+              <a:t>G</a:t>
+            </a:r>
+          </a:p>
+        </p:txBody>
+      </p:sp>
+      <p:sp>
+        <p:nvSpPr>
+          <p:cNvPr id="82" name="Right Arrow 81">
+            <a:extLst>
+              <a:ext uri="{FF2B5EF4-FFF2-40B4-BE49-F238E27FC236}">
+                <a16:creationId xmlns:a16="http://schemas.microsoft.com/office/drawing/2014/main" id="{0BAD5988-62BE-9B4F-8BF8-CA33B9D53130}"/>
+              </a:ext>
+            </a:extLst>
+          </p:cNvPr>
+          <p:cNvSpPr/>
+          <p:nvPr/>
+        </p:nvSpPr>
+        <p:spPr>
+          <a:xfrm>
+            <a:off x="4065532" y="2681633"/>
+            <a:ext cx="350566" cy="198201"/>
+          </a:xfrm>
+          <a:prstGeom prst="rightArrow">
+            <a:avLst/>
+          </a:prstGeom>
+        </p:spPr>
+        <p:style>
+          <a:lnRef idx="2">
+            <a:schemeClr val="accent1">
+              <a:shade val="50000"/>
+            </a:schemeClr>
+          </a:lnRef>
+          <a:fillRef idx="1">
+            <a:schemeClr val="accent1"/>
+          </a:fillRef>
+          <a:effectRef idx="0">
+            <a:schemeClr val="accent1"/>
+          </a:effectRef>
+          <a:fontRef idx="minor">
+            <a:schemeClr val="lt1"/>
+          </a:fontRef>
+        </p:style>
+        <p:txBody>
+          <a:bodyPr rtlCol="0" anchor="ctr"/>
+          <a:lstStyle/>
+          <a:p>
+            <a:pPr algn="ctr"/>
+            <a:endParaRPr lang="en-US"/>
+          </a:p>
+        </p:txBody>
+      </p:sp>
+      <p:sp>
+        <p:nvSpPr>
+          <p:cNvPr id="83" name="TextBox 82">
+            <a:extLst>
+              <a:ext uri="{FF2B5EF4-FFF2-40B4-BE49-F238E27FC236}">
+                <a16:creationId xmlns:a16="http://schemas.microsoft.com/office/drawing/2014/main" id="{5BB8DABC-38AD-4942-BBFC-19919E727A92}"/>
+              </a:ext>
+            </a:extLst>
+          </p:cNvPr>
+          <p:cNvSpPr txBox="1"/>
+          <p:nvPr/>
+        </p:nvSpPr>
+        <p:spPr>
+          <a:xfrm>
+            <a:off x="3891775" y="2469709"/>
+            <a:ext cx="736099" cy="276999"/>
+          </a:xfrm>
+          <a:prstGeom prst="rect">
+            <a:avLst/>
+          </a:prstGeom>
+          <a:noFill/>
+        </p:spPr>
+        <p:txBody>
+          <a:bodyPr wrap="none" rtlCol="0">
+            <a:spAutoFit/>
+          </a:bodyPr>
+          <a:lstStyle/>
+          <a:p>
+            <a:r>
+              <a:rPr lang="en-US" sz="1200" dirty="0"/>
+              <a:t>enqueue</a:t>
+            </a:r>
+          </a:p>
+        </p:txBody>
+      </p:sp>
+      <p:sp>
+        <p:nvSpPr>
+          <p:cNvPr id="84" name="Right Arrow 83">
+            <a:extLst>
+              <a:ext uri="{FF2B5EF4-FFF2-40B4-BE49-F238E27FC236}">
+                <a16:creationId xmlns:a16="http://schemas.microsoft.com/office/drawing/2014/main" id="{D6F6BC65-7951-C742-9840-C41CF0A88F91}"/>
+              </a:ext>
+            </a:extLst>
+          </p:cNvPr>
+          <p:cNvSpPr/>
+          <p:nvPr/>
+        </p:nvSpPr>
+        <p:spPr>
+          <a:xfrm>
+            <a:off x="7409928" y="2675885"/>
+            <a:ext cx="350566" cy="198201"/>
+          </a:xfrm>
+          <a:prstGeom prst="rightArrow">
+            <a:avLst/>
+          </a:prstGeom>
+        </p:spPr>
+        <p:style>
+          <a:lnRef idx="2">
+            <a:schemeClr val="accent1">
+              <a:shade val="50000"/>
+            </a:schemeClr>
+          </a:lnRef>
+          <a:fillRef idx="1">
+            <a:schemeClr val="accent1"/>
+          </a:fillRef>
+          <a:effectRef idx="0">
+            <a:schemeClr val="accent1"/>
+          </a:effectRef>
+          <a:fontRef idx="minor">
+            <a:schemeClr val="lt1"/>
+          </a:fontRef>
+        </p:style>
+        <p:txBody>
+          <a:bodyPr rtlCol="0" anchor="ctr"/>
+          <a:lstStyle/>
+          <a:p>
+            <a:pPr algn="ctr"/>
+            <a:endParaRPr lang="en-US"/>
+          </a:p>
+        </p:txBody>
+      </p:sp>
+      <p:sp>
+        <p:nvSpPr>
+          <p:cNvPr id="86" name="TextBox 85">
+            <a:extLst>
+              <a:ext uri="{FF2B5EF4-FFF2-40B4-BE49-F238E27FC236}">
+                <a16:creationId xmlns:a16="http://schemas.microsoft.com/office/drawing/2014/main" id="{6097939F-80DF-A149-B26F-6E439634DFDB}"/>
+              </a:ext>
+            </a:extLst>
+          </p:cNvPr>
+          <p:cNvSpPr txBox="1"/>
+          <p:nvPr/>
+        </p:nvSpPr>
+        <p:spPr>
+          <a:xfrm>
+            <a:off x="7293521" y="2463614"/>
+            <a:ext cx="736099" cy="276999"/>
+          </a:xfrm>
+          <a:prstGeom prst="rect">
+            <a:avLst/>
+          </a:prstGeom>
+          <a:noFill/>
+        </p:spPr>
+        <p:txBody>
+          <a:bodyPr wrap="none" rtlCol="0">
+            <a:spAutoFit/>
+          </a:bodyPr>
+          <a:lstStyle/>
+          <a:p>
+            <a:r>
+              <a:rPr lang="en-US" sz="1200" dirty="0"/>
+              <a:t>dequeue</a:t>
+            </a:r>
+          </a:p>
+        </p:txBody>
+      </p:sp>
+      <p:sp>
+        <p:nvSpPr>
+          <p:cNvPr id="87" name="Rectangle 86">
+            <a:extLst>
+              <a:ext uri="{FF2B5EF4-FFF2-40B4-BE49-F238E27FC236}">
+                <a16:creationId xmlns:a16="http://schemas.microsoft.com/office/drawing/2014/main" id="{A97B50B9-C6E7-1249-9D2A-4A705F9978D2}"/>
+              </a:ext>
+            </a:extLst>
+          </p:cNvPr>
+          <p:cNvSpPr/>
+          <p:nvPr/>
+        </p:nvSpPr>
+        <p:spPr>
+          <a:xfrm>
+            <a:off x="4480613" y="3292034"/>
+            <a:ext cx="397447" cy="757721"/>
+          </a:xfrm>
+          <a:prstGeom prst="rect">
+            <a:avLst/>
+          </a:prstGeom>
+        </p:spPr>
+        <p:style>
+          <a:lnRef idx="2">
+            <a:schemeClr val="accent1">
+              <a:shade val="50000"/>
+            </a:schemeClr>
+          </a:lnRef>
+          <a:fillRef idx="1">
+            <a:schemeClr val="accent1"/>
+          </a:fillRef>
+          <a:effectRef idx="0">
+            <a:schemeClr val="accent1"/>
+          </a:effectRef>
+          <a:fontRef idx="minor">
+            <a:schemeClr val="lt1"/>
+          </a:fontRef>
+        </p:style>
+        <p:txBody>
+          <a:bodyPr rtlCol="0" anchor="ctr"/>
+          <a:lstStyle/>
+          <a:p>
+            <a:pPr algn="ctr"/>
+            <a:endParaRPr lang="en-US"/>
+          </a:p>
+        </p:txBody>
+      </p:sp>
+      <p:sp>
+        <p:nvSpPr>
+          <p:cNvPr id="88" name="Oval 87">
+            <a:extLst>
+              <a:ext uri="{FF2B5EF4-FFF2-40B4-BE49-F238E27FC236}">
+                <a16:creationId xmlns:a16="http://schemas.microsoft.com/office/drawing/2014/main" id="{0C621DCC-DB95-A14B-BCD3-CB904A01C4BE}"/>
+              </a:ext>
+            </a:extLst>
+          </p:cNvPr>
+          <p:cNvSpPr/>
+          <p:nvPr/>
+        </p:nvSpPr>
+        <p:spPr>
+          <a:xfrm>
+            <a:off x="4501866" y="3298136"/>
+            <a:ext cx="357002" cy="328629"/>
+          </a:xfrm>
+          <a:prstGeom prst="ellipse">
+            <a:avLst/>
+          </a:prstGeom>
+          <a:solidFill>
+            <a:srgbClr val="FFFF00"/>
+          </a:solidFill>
+        </p:spPr>
+        <p:style>
+          <a:lnRef idx="2">
+            <a:schemeClr val="accent1">
+              <a:shade val="50000"/>
+            </a:schemeClr>
+          </a:lnRef>
+          <a:fillRef idx="1">
+            <a:schemeClr val="accent1"/>
+          </a:fillRef>
+          <a:effectRef idx="0">
+            <a:schemeClr val="accent1"/>
+          </a:effectRef>
+          <a:fontRef idx="minor">
+            <a:schemeClr val="lt1"/>
+          </a:fontRef>
+        </p:style>
+        <p:txBody>
+          <a:bodyPr rtlCol="0" anchor="ctr"/>
+          <a:lstStyle/>
+          <a:p>
+            <a:pPr algn="ctr"/>
+            <a:r>
+              <a:rPr lang="en-US" dirty="0">
+                <a:solidFill>
+                  <a:schemeClr val="bg1"/>
+                </a:solidFill>
+              </a:rPr>
+              <a:t>G</a:t>
+            </a:r>
+          </a:p>
+        </p:txBody>
+      </p:sp>
+      <p:sp>
+        <p:nvSpPr>
+          <p:cNvPr id="89" name="Oval 88">
+            <a:extLst>
+              <a:ext uri="{FF2B5EF4-FFF2-40B4-BE49-F238E27FC236}">
+                <a16:creationId xmlns:a16="http://schemas.microsoft.com/office/drawing/2014/main" id="{5C121738-11FC-D148-A8C0-BAEE6D02583A}"/>
+              </a:ext>
+            </a:extLst>
+          </p:cNvPr>
+          <p:cNvSpPr/>
+          <p:nvPr/>
+        </p:nvSpPr>
+        <p:spPr>
+          <a:xfrm>
+            <a:off x="4485671" y="3712938"/>
+            <a:ext cx="357002" cy="328629"/>
+          </a:xfrm>
+          <a:prstGeom prst="ellipse">
+            <a:avLst/>
+          </a:prstGeom>
+          <a:solidFill>
+            <a:srgbClr val="FFFF00"/>
+          </a:solidFill>
+        </p:spPr>
+        <p:style>
+          <a:lnRef idx="2">
+            <a:schemeClr val="accent1">
+              <a:shade val="50000"/>
+            </a:schemeClr>
+          </a:lnRef>
+          <a:fillRef idx="1">
+            <a:schemeClr val="accent1"/>
+          </a:fillRef>
+          <a:effectRef idx="0">
+            <a:schemeClr val="accent1"/>
+          </a:effectRef>
+          <a:fontRef idx="minor">
+            <a:schemeClr val="lt1"/>
+          </a:fontRef>
+        </p:style>
+        <p:txBody>
+          <a:bodyPr rtlCol="0" anchor="ctr"/>
+          <a:lstStyle/>
+          <a:p>
+            <a:pPr algn="ctr"/>
+            <a:r>
+              <a:rPr lang="en-US" dirty="0">
+                <a:solidFill>
+                  <a:schemeClr val="bg1"/>
+                </a:solidFill>
+              </a:rPr>
+              <a:t>G</a:t>
+            </a:r>
+          </a:p>
+        </p:txBody>
+      </p:sp>
+      <p:sp>
+        <p:nvSpPr>
+          <p:cNvPr id="90" name="TextBox 89">
+            <a:extLst>
+              <a:ext uri="{FF2B5EF4-FFF2-40B4-BE49-F238E27FC236}">
+                <a16:creationId xmlns:a16="http://schemas.microsoft.com/office/drawing/2014/main" id="{4E550333-4483-E546-B156-1CF63FC92D15}"/>
+              </a:ext>
+            </a:extLst>
+          </p:cNvPr>
+          <p:cNvSpPr txBox="1"/>
+          <p:nvPr/>
+        </p:nvSpPr>
+        <p:spPr>
+          <a:xfrm>
+            <a:off x="4534104" y="3483033"/>
+            <a:ext cx="290464" cy="276999"/>
+          </a:xfrm>
+          <a:prstGeom prst="rect">
+            <a:avLst/>
+          </a:prstGeom>
+          <a:noFill/>
+        </p:spPr>
+        <p:txBody>
+          <a:bodyPr wrap="none" rtlCol="0">
+            <a:spAutoFit/>
+          </a:bodyPr>
+          <a:lstStyle/>
+          <a:p>
+            <a:r>
+              <a:rPr lang="en-US" sz="1200" dirty="0"/>
+              <a:t>…</a:t>
+            </a:r>
+          </a:p>
+        </p:txBody>
+      </p:sp>
+      <p:sp>
+        <p:nvSpPr>
+          <p:cNvPr id="91" name="Rectangle 90">
+            <a:extLst>
+              <a:ext uri="{FF2B5EF4-FFF2-40B4-BE49-F238E27FC236}">
+                <a16:creationId xmlns:a16="http://schemas.microsoft.com/office/drawing/2014/main" id="{9862BA62-E083-2848-99C3-B15F3D672C47}"/>
+              </a:ext>
+            </a:extLst>
+          </p:cNvPr>
+          <p:cNvSpPr/>
+          <p:nvPr/>
+        </p:nvSpPr>
+        <p:spPr>
+          <a:xfrm>
+            <a:off x="5055663" y="3040505"/>
+            <a:ext cx="1782192" cy="170375"/>
+          </a:xfrm>
+          <a:prstGeom prst="rect">
+            <a:avLst/>
+          </a:prstGeom>
+        </p:spPr>
+        <p:style>
+          <a:lnRef idx="2">
+            <a:schemeClr val="accent1">
+              <a:shade val="50000"/>
+            </a:schemeClr>
+          </a:lnRef>
+          <a:fillRef idx="1">
+            <a:schemeClr val="accent1"/>
+          </a:fillRef>
+          <a:effectRef idx="0">
+            <a:schemeClr val="accent1"/>
+          </a:effectRef>
+          <a:fontRef idx="minor">
+            <a:schemeClr val="lt1"/>
+          </a:fontRef>
+        </p:style>
+        <p:txBody>
+          <a:bodyPr rtlCol="0" anchor="ctr"/>
+          <a:lstStyle/>
+          <a:p>
+            <a:pPr algn="ctr"/>
+            <a:r>
+              <a:rPr lang="en-US" sz="1200" dirty="0"/>
+              <a:t>Local Runnable Queue</a:t>
+            </a:r>
+          </a:p>
+        </p:txBody>
+      </p:sp>
+      <p:sp>
+        <p:nvSpPr>
+          <p:cNvPr id="96" name="Rectangle 95">
+            <a:extLst>
+              <a:ext uri="{FF2B5EF4-FFF2-40B4-BE49-F238E27FC236}">
+                <a16:creationId xmlns:a16="http://schemas.microsoft.com/office/drawing/2014/main" id="{51447476-5D76-1543-8531-3A5498FE919A}"/>
+              </a:ext>
+            </a:extLst>
+          </p:cNvPr>
+          <p:cNvSpPr/>
+          <p:nvPr/>
+        </p:nvSpPr>
+        <p:spPr>
+          <a:xfrm>
+            <a:off x="4501866" y="4208631"/>
+            <a:ext cx="384207" cy="338319"/>
+          </a:xfrm>
+          <a:prstGeom prst="rect">
+            <a:avLst/>
+          </a:prstGeom>
+          <a:solidFill>
+            <a:srgbClr val="FF0000"/>
+          </a:solidFill>
+          <a:ln>
+            <a:solidFill>
+              <a:schemeClr val="bg1"/>
+            </a:solidFill>
+          </a:ln>
+        </p:spPr>
+        <p:style>
+          <a:lnRef idx="2">
+            <a:schemeClr val="accent1">
+              <a:shade val="50000"/>
+            </a:schemeClr>
+          </a:lnRef>
+          <a:fillRef idx="1">
+            <a:schemeClr val="accent1"/>
+          </a:fillRef>
+          <a:effectRef idx="0">
+            <a:schemeClr val="accent1"/>
+          </a:effectRef>
+          <a:fontRef idx="minor">
+            <a:schemeClr val="lt1"/>
+          </a:fontRef>
+        </p:style>
+        <p:txBody>
+          <a:bodyPr rtlCol="0" anchor="ctr"/>
+          <a:lstStyle/>
+          <a:p>
+            <a:pPr algn="ctr"/>
+            <a:r>
+              <a:rPr lang="en-US" dirty="0"/>
+              <a:t>P</a:t>
+            </a:r>
+          </a:p>
+        </p:txBody>
+      </p:sp>
+      <p:sp>
+        <p:nvSpPr>
+          <p:cNvPr id="97" name="Rectangle 96">
+            <a:extLst>
+              <a:ext uri="{FF2B5EF4-FFF2-40B4-BE49-F238E27FC236}">
+                <a16:creationId xmlns:a16="http://schemas.microsoft.com/office/drawing/2014/main" id="{40160C72-5034-3441-B1C7-C56AB024350C}"/>
+              </a:ext>
+            </a:extLst>
+          </p:cNvPr>
+          <p:cNvSpPr/>
+          <p:nvPr/>
+        </p:nvSpPr>
+        <p:spPr>
+          <a:xfrm>
+            <a:off x="5074374" y="3285932"/>
+            <a:ext cx="397447" cy="757721"/>
+          </a:xfrm>
+          <a:prstGeom prst="rect">
+            <a:avLst/>
+          </a:prstGeom>
+        </p:spPr>
+        <p:style>
+          <a:lnRef idx="2">
+            <a:schemeClr val="accent1">
+              <a:shade val="50000"/>
+            </a:schemeClr>
+          </a:lnRef>
+          <a:fillRef idx="1">
+            <a:schemeClr val="accent1"/>
+          </a:fillRef>
+          <a:effectRef idx="0">
+            <a:schemeClr val="accent1"/>
+          </a:effectRef>
+          <a:fontRef idx="minor">
+            <a:schemeClr val="lt1"/>
+          </a:fontRef>
+        </p:style>
+        <p:txBody>
+          <a:bodyPr rtlCol="0" anchor="ctr"/>
+          <a:lstStyle/>
+          <a:p>
+            <a:pPr algn="ctr"/>
+            <a:endParaRPr lang="en-US"/>
+          </a:p>
+        </p:txBody>
+      </p:sp>
+      <p:sp>
+        <p:nvSpPr>
+          <p:cNvPr id="98" name="Oval 97">
+            <a:extLst>
+              <a:ext uri="{FF2B5EF4-FFF2-40B4-BE49-F238E27FC236}">
+                <a16:creationId xmlns:a16="http://schemas.microsoft.com/office/drawing/2014/main" id="{ABD8E95C-73AC-1849-830E-37F64BB6EF42}"/>
+              </a:ext>
+            </a:extLst>
+          </p:cNvPr>
+          <p:cNvSpPr/>
+          <p:nvPr/>
+        </p:nvSpPr>
+        <p:spPr>
+          <a:xfrm>
+            <a:off x="5095627" y="3292034"/>
+            <a:ext cx="357002" cy="328629"/>
+          </a:xfrm>
+          <a:prstGeom prst="ellipse">
+            <a:avLst/>
+          </a:prstGeom>
+          <a:solidFill>
+            <a:srgbClr val="FFFF00"/>
+          </a:solidFill>
+        </p:spPr>
+        <p:style>
+          <a:lnRef idx="2">
+            <a:schemeClr val="accent1">
+              <a:shade val="50000"/>
+            </a:schemeClr>
+          </a:lnRef>
+          <a:fillRef idx="1">
+            <a:schemeClr val="accent1"/>
+          </a:fillRef>
+          <a:effectRef idx="0">
+            <a:schemeClr val="accent1"/>
+          </a:effectRef>
+          <a:fontRef idx="minor">
+            <a:schemeClr val="lt1"/>
+          </a:fontRef>
+        </p:style>
+        <p:txBody>
+          <a:bodyPr rtlCol="0" anchor="ctr"/>
+          <a:lstStyle/>
+          <a:p>
+            <a:pPr algn="ctr"/>
+            <a:r>
+              <a:rPr lang="en-US" dirty="0">
+                <a:solidFill>
+                  <a:schemeClr val="bg1"/>
+                </a:solidFill>
+              </a:rPr>
+              <a:t>G</a:t>
+            </a:r>
+          </a:p>
+        </p:txBody>
+      </p:sp>
+      <p:sp>
+        <p:nvSpPr>
+          <p:cNvPr id="99" name="Oval 98">
+            <a:extLst>
+              <a:ext uri="{FF2B5EF4-FFF2-40B4-BE49-F238E27FC236}">
+                <a16:creationId xmlns:a16="http://schemas.microsoft.com/office/drawing/2014/main" id="{1440916B-0A70-EE45-B8A9-5F3C325ECDDB}"/>
+              </a:ext>
+            </a:extLst>
+          </p:cNvPr>
+          <p:cNvSpPr/>
+          <p:nvPr/>
+        </p:nvSpPr>
+        <p:spPr>
+          <a:xfrm>
+            <a:off x="5079432" y="3706836"/>
+            <a:ext cx="357002" cy="328629"/>
+          </a:xfrm>
+          <a:prstGeom prst="ellipse">
+            <a:avLst/>
+          </a:prstGeom>
+          <a:solidFill>
+            <a:srgbClr val="FFFF00"/>
+          </a:solidFill>
+        </p:spPr>
+        <p:style>
+          <a:lnRef idx="2">
+            <a:schemeClr val="accent1">
+              <a:shade val="50000"/>
+            </a:schemeClr>
+          </a:lnRef>
+          <a:fillRef idx="1">
+            <a:schemeClr val="accent1"/>
+          </a:fillRef>
+          <a:effectRef idx="0">
+            <a:schemeClr val="accent1"/>
+          </a:effectRef>
+          <a:fontRef idx="minor">
+            <a:schemeClr val="lt1"/>
+          </a:fontRef>
+        </p:style>
+        <p:txBody>
+          <a:bodyPr rtlCol="0" anchor="ctr"/>
+          <a:lstStyle/>
+          <a:p>
+            <a:pPr algn="ctr"/>
+            <a:r>
+              <a:rPr lang="en-US" dirty="0">
+                <a:solidFill>
+                  <a:schemeClr val="bg1"/>
+                </a:solidFill>
+              </a:rPr>
+              <a:t>G</a:t>
+            </a:r>
+          </a:p>
+        </p:txBody>
+      </p:sp>
+      <p:sp>
+        <p:nvSpPr>
+          <p:cNvPr id="100" name="TextBox 99">
+            <a:extLst>
+              <a:ext uri="{FF2B5EF4-FFF2-40B4-BE49-F238E27FC236}">
+                <a16:creationId xmlns:a16="http://schemas.microsoft.com/office/drawing/2014/main" id="{FEE62A86-1409-E948-AEC4-50173589977A}"/>
+              </a:ext>
+            </a:extLst>
+          </p:cNvPr>
+          <p:cNvSpPr txBox="1"/>
+          <p:nvPr/>
+        </p:nvSpPr>
+        <p:spPr>
+          <a:xfrm>
+            <a:off x="5127865" y="3476931"/>
+            <a:ext cx="290464" cy="276999"/>
+          </a:xfrm>
+          <a:prstGeom prst="rect">
+            <a:avLst/>
+          </a:prstGeom>
+          <a:noFill/>
+        </p:spPr>
+        <p:txBody>
+          <a:bodyPr wrap="none" rtlCol="0">
+            <a:spAutoFit/>
+          </a:bodyPr>
+          <a:lstStyle/>
+          <a:p>
+            <a:r>
+              <a:rPr lang="en-US" sz="1200" dirty="0"/>
+              <a:t>…</a:t>
+            </a:r>
+          </a:p>
+        </p:txBody>
+      </p:sp>
+      <p:sp>
+        <p:nvSpPr>
+          <p:cNvPr id="101" name="Rectangle 100">
+            <a:extLst>
+              <a:ext uri="{FF2B5EF4-FFF2-40B4-BE49-F238E27FC236}">
+                <a16:creationId xmlns:a16="http://schemas.microsoft.com/office/drawing/2014/main" id="{A7869E91-D3A7-0F45-96A9-5E2B31F00A17}"/>
+              </a:ext>
+            </a:extLst>
+          </p:cNvPr>
+          <p:cNvSpPr/>
+          <p:nvPr/>
+        </p:nvSpPr>
+        <p:spPr>
+          <a:xfrm>
+            <a:off x="5095627" y="4202529"/>
+            <a:ext cx="384207" cy="338319"/>
+          </a:xfrm>
+          <a:prstGeom prst="rect">
+            <a:avLst/>
+          </a:prstGeom>
+          <a:solidFill>
+            <a:srgbClr val="FF0000"/>
+          </a:solidFill>
+          <a:ln>
+            <a:solidFill>
+              <a:schemeClr val="bg1"/>
+            </a:solidFill>
+          </a:ln>
+        </p:spPr>
+        <p:style>
+          <a:lnRef idx="2">
+            <a:schemeClr val="accent1">
+              <a:shade val="50000"/>
+            </a:schemeClr>
+          </a:lnRef>
+          <a:fillRef idx="1">
+            <a:schemeClr val="accent1"/>
+          </a:fillRef>
+          <a:effectRef idx="0">
+            <a:schemeClr val="accent1"/>
+          </a:effectRef>
+          <a:fontRef idx="minor">
+            <a:schemeClr val="lt1"/>
+          </a:fontRef>
+        </p:style>
+        <p:txBody>
+          <a:bodyPr rtlCol="0" anchor="ctr"/>
+          <a:lstStyle/>
+          <a:p>
+            <a:pPr algn="ctr"/>
+            <a:r>
+              <a:rPr lang="en-US" dirty="0"/>
+              <a:t>P</a:t>
+            </a:r>
+          </a:p>
+        </p:txBody>
+      </p:sp>
+      <p:sp>
+        <p:nvSpPr>
+          <p:cNvPr id="102" name="Rectangle 101">
+            <a:extLst>
+              <a:ext uri="{FF2B5EF4-FFF2-40B4-BE49-F238E27FC236}">
+                <a16:creationId xmlns:a16="http://schemas.microsoft.com/office/drawing/2014/main" id="{41BCE85A-C951-2D4C-A11C-7CDB7F756BA4}"/>
+              </a:ext>
+            </a:extLst>
+          </p:cNvPr>
+          <p:cNvSpPr/>
+          <p:nvPr/>
+        </p:nvSpPr>
+        <p:spPr>
+          <a:xfrm>
+            <a:off x="5678360" y="3287371"/>
+            <a:ext cx="397447" cy="757721"/>
+          </a:xfrm>
+          <a:prstGeom prst="rect">
+            <a:avLst/>
+          </a:prstGeom>
+        </p:spPr>
+        <p:style>
+          <a:lnRef idx="2">
+            <a:schemeClr val="accent1">
+              <a:shade val="50000"/>
+            </a:schemeClr>
+          </a:lnRef>
+          <a:fillRef idx="1">
+            <a:schemeClr val="accent1"/>
+          </a:fillRef>
+          <a:effectRef idx="0">
+            <a:schemeClr val="accent1"/>
+          </a:effectRef>
+          <a:fontRef idx="minor">
+            <a:schemeClr val="lt1"/>
+          </a:fontRef>
+        </p:style>
+        <p:txBody>
+          <a:bodyPr rtlCol="0" anchor="ctr"/>
+          <a:lstStyle/>
+          <a:p>
+            <a:pPr algn="ctr"/>
+            <a:endParaRPr lang="en-US"/>
+          </a:p>
+        </p:txBody>
+      </p:sp>
+      <p:sp>
+        <p:nvSpPr>
+          <p:cNvPr id="103" name="Oval 102">
+            <a:extLst>
+              <a:ext uri="{FF2B5EF4-FFF2-40B4-BE49-F238E27FC236}">
+                <a16:creationId xmlns:a16="http://schemas.microsoft.com/office/drawing/2014/main" id="{4AF56D8A-6E66-3342-9CEB-122728C73973}"/>
+              </a:ext>
+            </a:extLst>
+          </p:cNvPr>
+          <p:cNvSpPr/>
+          <p:nvPr/>
+        </p:nvSpPr>
+        <p:spPr>
+          <a:xfrm>
+            <a:off x="5700528" y="3304203"/>
+            <a:ext cx="357002" cy="328629"/>
+          </a:xfrm>
+          <a:prstGeom prst="ellipse">
+            <a:avLst/>
+          </a:prstGeom>
+          <a:solidFill>
+            <a:srgbClr val="FFFF00"/>
+          </a:solidFill>
+        </p:spPr>
+        <p:style>
+          <a:lnRef idx="2">
+            <a:schemeClr val="accent1">
+              <a:shade val="50000"/>
+            </a:schemeClr>
+          </a:lnRef>
+          <a:fillRef idx="1">
+            <a:schemeClr val="accent1"/>
+          </a:fillRef>
+          <a:effectRef idx="0">
+            <a:schemeClr val="accent1"/>
+          </a:effectRef>
+          <a:fontRef idx="minor">
+            <a:schemeClr val="lt1"/>
+          </a:fontRef>
+        </p:style>
+        <p:txBody>
+          <a:bodyPr rtlCol="0" anchor="ctr"/>
+          <a:lstStyle/>
+          <a:p>
+            <a:pPr algn="ctr"/>
+            <a:r>
+              <a:rPr lang="en-US" dirty="0">
+                <a:solidFill>
+                  <a:schemeClr val="bg1"/>
+                </a:solidFill>
+              </a:rPr>
+              <a:t>G</a:t>
+            </a:r>
+          </a:p>
+        </p:txBody>
+      </p:sp>
+      <p:sp>
+        <p:nvSpPr>
+          <p:cNvPr id="104" name="Oval 103">
+            <a:extLst>
+              <a:ext uri="{FF2B5EF4-FFF2-40B4-BE49-F238E27FC236}">
+                <a16:creationId xmlns:a16="http://schemas.microsoft.com/office/drawing/2014/main" id="{FA6FAE03-F361-B645-B016-44499E9B024F}"/>
+              </a:ext>
+            </a:extLst>
+          </p:cNvPr>
+          <p:cNvSpPr/>
+          <p:nvPr/>
+        </p:nvSpPr>
+        <p:spPr>
+          <a:xfrm>
+            <a:off x="5707540" y="3718490"/>
+            <a:ext cx="357002" cy="328629"/>
+          </a:xfrm>
+          <a:prstGeom prst="ellipse">
+            <a:avLst/>
+          </a:prstGeom>
+          <a:solidFill>
+            <a:srgbClr val="FFFF00"/>
+          </a:solidFill>
+        </p:spPr>
+        <p:style>
+          <a:lnRef idx="2">
+            <a:schemeClr val="accent1">
+              <a:shade val="50000"/>
+            </a:schemeClr>
+          </a:lnRef>
+          <a:fillRef idx="1">
+            <a:schemeClr val="accent1"/>
+          </a:fillRef>
+          <a:effectRef idx="0">
+            <a:schemeClr val="accent1"/>
+          </a:effectRef>
+          <a:fontRef idx="minor">
+            <a:schemeClr val="lt1"/>
+          </a:fontRef>
+        </p:style>
+        <p:txBody>
+          <a:bodyPr rtlCol="0" anchor="ctr"/>
+          <a:lstStyle/>
+          <a:p>
+            <a:pPr algn="ctr"/>
+            <a:r>
+              <a:rPr lang="en-US" dirty="0">
+                <a:solidFill>
+                  <a:schemeClr val="bg1"/>
+                </a:solidFill>
+              </a:rPr>
+              <a:t>G</a:t>
+            </a:r>
+          </a:p>
+        </p:txBody>
+      </p:sp>
+      <p:sp>
+        <p:nvSpPr>
+          <p:cNvPr id="105" name="TextBox 104">
+            <a:extLst>
+              <a:ext uri="{FF2B5EF4-FFF2-40B4-BE49-F238E27FC236}">
+                <a16:creationId xmlns:a16="http://schemas.microsoft.com/office/drawing/2014/main" id="{02F84416-E444-B64F-ABE1-243D209A709F}"/>
+              </a:ext>
+            </a:extLst>
+          </p:cNvPr>
+          <p:cNvSpPr txBox="1"/>
+          <p:nvPr/>
+        </p:nvSpPr>
+        <p:spPr>
+          <a:xfrm>
+            <a:off x="5732766" y="3489100"/>
+            <a:ext cx="290464" cy="276999"/>
+          </a:xfrm>
+          <a:prstGeom prst="rect">
+            <a:avLst/>
+          </a:prstGeom>
+          <a:noFill/>
+        </p:spPr>
+        <p:txBody>
+          <a:bodyPr wrap="none" rtlCol="0">
+            <a:spAutoFit/>
+          </a:bodyPr>
+          <a:lstStyle/>
+          <a:p>
+            <a:r>
+              <a:rPr lang="en-US" sz="1200" dirty="0"/>
+              <a:t>…</a:t>
+            </a:r>
+          </a:p>
+        </p:txBody>
+      </p:sp>
+      <p:sp>
+        <p:nvSpPr>
+          <p:cNvPr id="106" name="Rectangle 105">
+            <a:extLst>
+              <a:ext uri="{FF2B5EF4-FFF2-40B4-BE49-F238E27FC236}">
+                <a16:creationId xmlns:a16="http://schemas.microsoft.com/office/drawing/2014/main" id="{278DB216-719E-324A-8671-C9A0014919EE}"/>
+              </a:ext>
+            </a:extLst>
+          </p:cNvPr>
+          <p:cNvSpPr/>
+          <p:nvPr/>
+        </p:nvSpPr>
+        <p:spPr>
+          <a:xfrm>
+            <a:off x="5700528" y="4202529"/>
+            <a:ext cx="384207" cy="338319"/>
+          </a:xfrm>
+          <a:prstGeom prst="rect">
+            <a:avLst/>
+          </a:prstGeom>
+          <a:solidFill>
+            <a:srgbClr val="FF0000"/>
+          </a:solidFill>
+          <a:ln>
+            <a:solidFill>
+              <a:schemeClr val="bg1"/>
+            </a:solidFill>
+          </a:ln>
+        </p:spPr>
+        <p:style>
+          <a:lnRef idx="2">
+            <a:schemeClr val="accent1">
+              <a:shade val="50000"/>
+            </a:schemeClr>
+          </a:lnRef>
+          <a:fillRef idx="1">
+            <a:schemeClr val="accent1"/>
+          </a:fillRef>
+          <a:effectRef idx="0">
+            <a:schemeClr val="accent1"/>
+          </a:effectRef>
+          <a:fontRef idx="minor">
+            <a:schemeClr val="lt1"/>
+          </a:fontRef>
+        </p:style>
+        <p:txBody>
+          <a:bodyPr rtlCol="0" anchor="ctr"/>
+          <a:lstStyle/>
+          <a:p>
+            <a:pPr algn="ctr"/>
+            <a:r>
+              <a:rPr lang="en-US" dirty="0"/>
+              <a:t>P</a:t>
+            </a:r>
+          </a:p>
+        </p:txBody>
+      </p:sp>
+      <p:sp>
+        <p:nvSpPr>
+          <p:cNvPr id="107" name="TextBox 106">
+            <a:extLst>
+              <a:ext uri="{FF2B5EF4-FFF2-40B4-BE49-F238E27FC236}">
+                <a16:creationId xmlns:a16="http://schemas.microsoft.com/office/drawing/2014/main" id="{3C574805-5EF9-5441-BACD-B13A0A5DB0AE}"/>
+              </a:ext>
+            </a:extLst>
+          </p:cNvPr>
+          <p:cNvSpPr txBox="1"/>
+          <p:nvPr/>
+        </p:nvSpPr>
+        <p:spPr>
+          <a:xfrm>
+            <a:off x="6098153" y="3430764"/>
+            <a:ext cx="343364" cy="369332"/>
+          </a:xfrm>
+          <a:prstGeom prst="rect">
+            <a:avLst/>
+          </a:prstGeom>
+          <a:noFill/>
+        </p:spPr>
+        <p:txBody>
+          <a:bodyPr wrap="none" rtlCol="0">
+            <a:spAutoFit/>
+          </a:bodyPr>
+          <a:lstStyle/>
+          <a:p>
+            <a:r>
+              <a:rPr lang="en-US" dirty="0"/>
+              <a:t>…</a:t>
+            </a:r>
+          </a:p>
+        </p:txBody>
+      </p:sp>
+      <p:sp>
+        <p:nvSpPr>
+          <p:cNvPr id="108" name="Rectangle 107">
+            <a:extLst>
+              <a:ext uri="{FF2B5EF4-FFF2-40B4-BE49-F238E27FC236}">
+                <a16:creationId xmlns:a16="http://schemas.microsoft.com/office/drawing/2014/main" id="{E34D2A14-FB16-F047-9F34-B20BE485B146}"/>
+              </a:ext>
+            </a:extLst>
+          </p:cNvPr>
+          <p:cNvSpPr/>
+          <p:nvPr/>
+        </p:nvSpPr>
+        <p:spPr>
+          <a:xfrm>
+            <a:off x="6459600" y="3285932"/>
+            <a:ext cx="397447" cy="757721"/>
+          </a:xfrm>
+          <a:prstGeom prst="rect">
+            <a:avLst/>
+          </a:prstGeom>
+        </p:spPr>
+        <p:style>
+          <a:lnRef idx="2">
+            <a:schemeClr val="accent1">
+              <a:shade val="50000"/>
+            </a:schemeClr>
+          </a:lnRef>
+          <a:fillRef idx="1">
+            <a:schemeClr val="accent1"/>
+          </a:fillRef>
+          <a:effectRef idx="0">
+            <a:schemeClr val="accent1"/>
+          </a:effectRef>
+          <a:fontRef idx="minor">
+            <a:schemeClr val="lt1"/>
+          </a:fontRef>
+        </p:style>
+        <p:txBody>
+          <a:bodyPr rtlCol="0" anchor="ctr"/>
+          <a:lstStyle/>
+          <a:p>
+            <a:pPr algn="ctr"/>
+            <a:endParaRPr lang="en-US"/>
+          </a:p>
+        </p:txBody>
+      </p:sp>
+      <p:sp>
+        <p:nvSpPr>
+          <p:cNvPr id="109" name="Oval 108">
+            <a:extLst>
+              <a:ext uri="{FF2B5EF4-FFF2-40B4-BE49-F238E27FC236}">
+                <a16:creationId xmlns:a16="http://schemas.microsoft.com/office/drawing/2014/main" id="{72B30EAB-F904-274C-90C2-3B212A8F1042}"/>
+              </a:ext>
+            </a:extLst>
+          </p:cNvPr>
+          <p:cNvSpPr/>
+          <p:nvPr/>
+        </p:nvSpPr>
+        <p:spPr>
+          <a:xfrm>
+            <a:off x="6480853" y="3292034"/>
+            <a:ext cx="357002" cy="328629"/>
+          </a:xfrm>
+          <a:prstGeom prst="ellipse">
+            <a:avLst/>
+          </a:prstGeom>
+          <a:solidFill>
+            <a:srgbClr val="FFFF00"/>
+          </a:solidFill>
+        </p:spPr>
+        <p:style>
+          <a:lnRef idx="2">
+            <a:schemeClr val="accent1">
+              <a:shade val="50000"/>
+            </a:schemeClr>
+          </a:lnRef>
+          <a:fillRef idx="1">
+            <a:schemeClr val="accent1"/>
+          </a:fillRef>
+          <a:effectRef idx="0">
+            <a:schemeClr val="accent1"/>
+          </a:effectRef>
+          <a:fontRef idx="minor">
+            <a:schemeClr val="lt1"/>
+          </a:fontRef>
+        </p:style>
+        <p:txBody>
+          <a:bodyPr rtlCol="0" anchor="ctr"/>
+          <a:lstStyle/>
+          <a:p>
+            <a:pPr algn="ctr"/>
+            <a:r>
+              <a:rPr lang="en-US" dirty="0">
+                <a:solidFill>
+                  <a:schemeClr val="bg1"/>
+                </a:solidFill>
+              </a:rPr>
+              <a:t>G</a:t>
+            </a:r>
+          </a:p>
+        </p:txBody>
+      </p:sp>
+      <p:sp>
+        <p:nvSpPr>
+          <p:cNvPr id="110" name="Oval 109">
+            <a:extLst>
+              <a:ext uri="{FF2B5EF4-FFF2-40B4-BE49-F238E27FC236}">
+                <a16:creationId xmlns:a16="http://schemas.microsoft.com/office/drawing/2014/main" id="{1BFDC5F3-1907-9B48-BC5E-79D87FB0B692}"/>
+              </a:ext>
+            </a:extLst>
+          </p:cNvPr>
+          <p:cNvSpPr/>
+          <p:nvPr/>
+        </p:nvSpPr>
+        <p:spPr>
+          <a:xfrm>
+            <a:off x="6464658" y="3706836"/>
+            <a:ext cx="357002" cy="328629"/>
+          </a:xfrm>
+          <a:prstGeom prst="ellipse">
+            <a:avLst/>
+          </a:prstGeom>
+          <a:solidFill>
+            <a:srgbClr val="FFFF00"/>
+          </a:solidFill>
+        </p:spPr>
+        <p:style>
+          <a:lnRef idx="2">
+            <a:schemeClr val="accent1">
+              <a:shade val="50000"/>
+            </a:schemeClr>
+          </a:lnRef>
+          <a:fillRef idx="1">
+            <a:schemeClr val="accent1"/>
+          </a:fillRef>
+          <a:effectRef idx="0">
+            <a:schemeClr val="accent1"/>
+          </a:effectRef>
+          <a:fontRef idx="minor">
+            <a:schemeClr val="lt1"/>
+          </a:fontRef>
+        </p:style>
+        <p:txBody>
+          <a:bodyPr rtlCol="0" anchor="ctr"/>
+          <a:lstStyle/>
+          <a:p>
+            <a:pPr algn="ctr"/>
+            <a:r>
+              <a:rPr lang="en-US" dirty="0">
+                <a:solidFill>
+                  <a:schemeClr val="bg1"/>
+                </a:solidFill>
+              </a:rPr>
+              <a:t>G</a:t>
+            </a:r>
+          </a:p>
+        </p:txBody>
+      </p:sp>
+      <p:sp>
+        <p:nvSpPr>
+          <p:cNvPr id="111" name="TextBox 110">
+            <a:extLst>
+              <a:ext uri="{FF2B5EF4-FFF2-40B4-BE49-F238E27FC236}">
+                <a16:creationId xmlns:a16="http://schemas.microsoft.com/office/drawing/2014/main" id="{5232110F-91E4-C140-9442-D3346B5C1A7C}"/>
+              </a:ext>
+            </a:extLst>
+          </p:cNvPr>
+          <p:cNvSpPr txBox="1"/>
+          <p:nvPr/>
+        </p:nvSpPr>
+        <p:spPr>
+          <a:xfrm>
+            <a:off x="6513091" y="3476931"/>
+            <a:ext cx="290464" cy="276999"/>
+          </a:xfrm>
+          <a:prstGeom prst="rect">
+            <a:avLst/>
+          </a:prstGeom>
+          <a:noFill/>
+        </p:spPr>
+        <p:txBody>
+          <a:bodyPr wrap="none" rtlCol="0">
+            <a:spAutoFit/>
+          </a:bodyPr>
+          <a:lstStyle/>
+          <a:p>
+            <a:r>
+              <a:rPr lang="en-US" sz="1200" dirty="0"/>
+              <a:t>…</a:t>
+            </a:r>
+          </a:p>
+        </p:txBody>
+      </p:sp>
+      <p:sp>
+        <p:nvSpPr>
+          <p:cNvPr id="112" name="Rectangle 111">
+            <a:extLst>
+              <a:ext uri="{FF2B5EF4-FFF2-40B4-BE49-F238E27FC236}">
+                <a16:creationId xmlns:a16="http://schemas.microsoft.com/office/drawing/2014/main" id="{7C019670-C3C3-7E45-8B69-D7AC84453152}"/>
+              </a:ext>
+            </a:extLst>
+          </p:cNvPr>
+          <p:cNvSpPr/>
+          <p:nvPr/>
+        </p:nvSpPr>
+        <p:spPr>
+          <a:xfrm>
+            <a:off x="6480853" y="4202529"/>
+            <a:ext cx="384207" cy="338319"/>
+          </a:xfrm>
+          <a:prstGeom prst="rect">
+            <a:avLst/>
+          </a:prstGeom>
+          <a:solidFill>
+            <a:srgbClr val="FF0000"/>
+          </a:solidFill>
+          <a:ln>
+            <a:solidFill>
+              <a:schemeClr val="bg1"/>
+            </a:solidFill>
+          </a:ln>
+        </p:spPr>
+        <p:style>
+          <a:lnRef idx="2">
+            <a:schemeClr val="accent1">
+              <a:shade val="50000"/>
+            </a:schemeClr>
+          </a:lnRef>
+          <a:fillRef idx="1">
+            <a:schemeClr val="accent1"/>
+          </a:fillRef>
+          <a:effectRef idx="0">
+            <a:schemeClr val="accent1"/>
+          </a:effectRef>
+          <a:fontRef idx="minor">
+            <a:schemeClr val="lt1"/>
+          </a:fontRef>
+        </p:style>
+        <p:txBody>
+          <a:bodyPr rtlCol="0" anchor="ctr"/>
+          <a:lstStyle/>
+          <a:p>
+            <a:pPr algn="ctr"/>
+            <a:r>
+              <a:rPr lang="en-US" dirty="0"/>
+              <a:t>P</a:t>
+            </a:r>
+          </a:p>
+        </p:txBody>
+      </p:sp>
+      <p:sp>
+        <p:nvSpPr>
+          <p:cNvPr id="113" name="Rectangle 112">
+            <a:extLst>
+              <a:ext uri="{FF2B5EF4-FFF2-40B4-BE49-F238E27FC236}">
+                <a16:creationId xmlns:a16="http://schemas.microsoft.com/office/drawing/2014/main" id="{343EDFE5-AF34-6E4F-820C-0660359CBD1C}"/>
+              </a:ext>
+            </a:extLst>
+          </p:cNvPr>
+          <p:cNvSpPr/>
+          <p:nvPr/>
+        </p:nvSpPr>
+        <p:spPr>
+          <a:xfrm>
+            <a:off x="6998830" y="3285932"/>
+            <a:ext cx="397447" cy="757721"/>
+          </a:xfrm>
+          <a:prstGeom prst="rect">
+            <a:avLst/>
+          </a:prstGeom>
+        </p:spPr>
+        <p:style>
+          <a:lnRef idx="2">
+            <a:schemeClr val="accent1">
+              <a:shade val="50000"/>
+            </a:schemeClr>
+          </a:lnRef>
+          <a:fillRef idx="1">
+            <a:schemeClr val="accent1"/>
+          </a:fillRef>
+          <a:effectRef idx="0">
+            <a:schemeClr val="accent1"/>
+          </a:effectRef>
+          <a:fontRef idx="minor">
+            <a:schemeClr val="lt1"/>
+          </a:fontRef>
+        </p:style>
+        <p:txBody>
+          <a:bodyPr rtlCol="0" anchor="ctr"/>
+          <a:lstStyle/>
+          <a:p>
+            <a:pPr algn="ctr"/>
+            <a:endParaRPr lang="en-US"/>
+          </a:p>
+        </p:txBody>
+      </p:sp>
+      <p:sp>
+        <p:nvSpPr>
+          <p:cNvPr id="114" name="Oval 113">
+            <a:extLst>
+              <a:ext uri="{FF2B5EF4-FFF2-40B4-BE49-F238E27FC236}">
+                <a16:creationId xmlns:a16="http://schemas.microsoft.com/office/drawing/2014/main" id="{F4F1629B-DA60-5643-ACEB-2E244165A91A}"/>
+              </a:ext>
+            </a:extLst>
+          </p:cNvPr>
+          <p:cNvSpPr/>
+          <p:nvPr/>
+        </p:nvSpPr>
+        <p:spPr>
+          <a:xfrm>
+            <a:off x="7020083" y="3292034"/>
+            <a:ext cx="357002" cy="328629"/>
+          </a:xfrm>
+          <a:prstGeom prst="ellipse">
+            <a:avLst/>
+          </a:prstGeom>
+          <a:solidFill>
+            <a:srgbClr val="FFFF00"/>
+          </a:solidFill>
+        </p:spPr>
+        <p:style>
+          <a:lnRef idx="2">
+            <a:schemeClr val="accent1">
+              <a:shade val="50000"/>
+            </a:schemeClr>
+          </a:lnRef>
+          <a:fillRef idx="1">
+            <a:schemeClr val="accent1"/>
+          </a:fillRef>
+          <a:effectRef idx="0">
+            <a:schemeClr val="accent1"/>
+          </a:effectRef>
+          <a:fontRef idx="minor">
+            <a:schemeClr val="lt1"/>
+          </a:fontRef>
+        </p:style>
+        <p:txBody>
+          <a:bodyPr rtlCol="0" anchor="ctr"/>
+          <a:lstStyle/>
+          <a:p>
+            <a:pPr algn="ctr"/>
+            <a:r>
+              <a:rPr lang="en-US" dirty="0">
+                <a:solidFill>
+                  <a:schemeClr val="bg1"/>
+                </a:solidFill>
+              </a:rPr>
+              <a:t>G</a:t>
+            </a:r>
+          </a:p>
+        </p:txBody>
+      </p:sp>
+      <p:sp>
+        <p:nvSpPr>
+          <p:cNvPr id="115" name="Oval 114">
+            <a:extLst>
+              <a:ext uri="{FF2B5EF4-FFF2-40B4-BE49-F238E27FC236}">
+                <a16:creationId xmlns:a16="http://schemas.microsoft.com/office/drawing/2014/main" id="{D6CD5D88-0183-BE4B-850C-102FD2F3DDA7}"/>
+              </a:ext>
+            </a:extLst>
+          </p:cNvPr>
+          <p:cNvSpPr/>
+          <p:nvPr/>
+        </p:nvSpPr>
+        <p:spPr>
+          <a:xfrm>
+            <a:off x="7003888" y="3706836"/>
+            <a:ext cx="357002" cy="328629"/>
+          </a:xfrm>
+          <a:prstGeom prst="ellipse">
+            <a:avLst/>
+          </a:prstGeom>
+          <a:solidFill>
+            <a:srgbClr val="FFFF00"/>
+          </a:solidFill>
+        </p:spPr>
+        <p:style>
+          <a:lnRef idx="2">
+            <a:schemeClr val="accent1">
+              <a:shade val="50000"/>
+            </a:schemeClr>
+          </a:lnRef>
+          <a:fillRef idx="1">
+            <a:schemeClr val="accent1"/>
+          </a:fillRef>
+          <a:effectRef idx="0">
+            <a:schemeClr val="accent1"/>
+          </a:effectRef>
+          <a:fontRef idx="minor">
+            <a:schemeClr val="lt1"/>
+          </a:fontRef>
+        </p:style>
+        <p:txBody>
+          <a:bodyPr rtlCol="0" anchor="ctr"/>
+          <a:lstStyle/>
+          <a:p>
+            <a:pPr algn="ctr"/>
+            <a:r>
+              <a:rPr lang="en-US" dirty="0">
+                <a:solidFill>
+                  <a:schemeClr val="bg1"/>
+                </a:solidFill>
+              </a:rPr>
+              <a:t>G</a:t>
+            </a:r>
+          </a:p>
+        </p:txBody>
+      </p:sp>
+      <p:sp>
+        <p:nvSpPr>
+          <p:cNvPr id="116" name="TextBox 115">
+            <a:extLst>
+              <a:ext uri="{FF2B5EF4-FFF2-40B4-BE49-F238E27FC236}">
+                <a16:creationId xmlns:a16="http://schemas.microsoft.com/office/drawing/2014/main" id="{B2E54933-32EC-1745-889C-BC682AD2FFC5}"/>
+              </a:ext>
+            </a:extLst>
+          </p:cNvPr>
+          <p:cNvSpPr txBox="1"/>
+          <p:nvPr/>
+        </p:nvSpPr>
+        <p:spPr>
+          <a:xfrm>
+            <a:off x="7052321" y="3476931"/>
+            <a:ext cx="290464" cy="276999"/>
+          </a:xfrm>
+          <a:prstGeom prst="rect">
+            <a:avLst/>
+          </a:prstGeom>
+          <a:noFill/>
+        </p:spPr>
+        <p:txBody>
+          <a:bodyPr wrap="none" rtlCol="0">
+            <a:spAutoFit/>
+          </a:bodyPr>
+          <a:lstStyle/>
+          <a:p>
+            <a:r>
+              <a:rPr lang="en-US" sz="1200" dirty="0"/>
+              <a:t>…</a:t>
+            </a:r>
+          </a:p>
+        </p:txBody>
+      </p:sp>
+      <p:sp>
+        <p:nvSpPr>
+          <p:cNvPr id="117" name="Rectangle 116">
+            <a:extLst>
+              <a:ext uri="{FF2B5EF4-FFF2-40B4-BE49-F238E27FC236}">
+                <a16:creationId xmlns:a16="http://schemas.microsoft.com/office/drawing/2014/main" id="{D9403C39-9DA9-3D48-AD92-27483CD1BC5E}"/>
+              </a:ext>
+            </a:extLst>
+          </p:cNvPr>
+          <p:cNvSpPr/>
+          <p:nvPr/>
+        </p:nvSpPr>
+        <p:spPr>
+          <a:xfrm>
+            <a:off x="7020083" y="4202529"/>
+            <a:ext cx="384207" cy="338319"/>
+          </a:xfrm>
+          <a:prstGeom prst="rect">
+            <a:avLst/>
+          </a:prstGeom>
+          <a:solidFill>
+            <a:srgbClr val="FF0000"/>
+          </a:solidFill>
+          <a:ln>
+            <a:solidFill>
+              <a:schemeClr val="bg1"/>
+            </a:solidFill>
+          </a:ln>
+        </p:spPr>
+        <p:style>
+          <a:lnRef idx="2">
+            <a:schemeClr val="accent1">
+              <a:shade val="50000"/>
+            </a:schemeClr>
+          </a:lnRef>
+          <a:fillRef idx="1">
+            <a:schemeClr val="accent1"/>
+          </a:fillRef>
+          <a:effectRef idx="0">
+            <a:schemeClr val="accent1"/>
+          </a:effectRef>
+          <a:fontRef idx="minor">
+            <a:schemeClr val="lt1"/>
+          </a:fontRef>
+        </p:style>
+        <p:txBody>
+          <a:bodyPr rtlCol="0" anchor="ctr"/>
+          <a:lstStyle/>
+          <a:p>
+            <a:pPr algn="ctr"/>
+            <a:r>
+              <a:rPr lang="en-US" dirty="0"/>
+              <a:t>P</a:t>
+            </a:r>
+          </a:p>
+        </p:txBody>
+      </p:sp>
+      <p:sp>
+        <p:nvSpPr>
+          <p:cNvPr id="118" name="Rectangle 117">
+            <a:extLst>
+              <a:ext uri="{FF2B5EF4-FFF2-40B4-BE49-F238E27FC236}">
+                <a16:creationId xmlns:a16="http://schemas.microsoft.com/office/drawing/2014/main" id="{5E3DDB43-2456-1B46-918B-F6ECCAD7A3A3}"/>
+              </a:ext>
+            </a:extLst>
+          </p:cNvPr>
+          <p:cNvSpPr/>
+          <p:nvPr/>
+        </p:nvSpPr>
+        <p:spPr>
+          <a:xfrm>
+            <a:off x="4507623" y="5080195"/>
+            <a:ext cx="358257" cy="280439"/>
+          </a:xfrm>
+          <a:prstGeom prst="rect">
+            <a:avLst/>
+          </a:prstGeom>
+          <a:solidFill>
+            <a:srgbClr val="7030A0"/>
+          </a:solidFill>
+          <a:ln>
+            <a:solidFill>
+              <a:schemeClr val="bg1"/>
+            </a:solidFill>
+          </a:ln>
+        </p:spPr>
+        <p:style>
+          <a:lnRef idx="2">
+            <a:schemeClr val="accent1">
+              <a:shade val="50000"/>
+            </a:schemeClr>
+          </a:lnRef>
+          <a:fillRef idx="1">
+            <a:schemeClr val="accent1"/>
+          </a:fillRef>
+          <a:effectRef idx="0">
+            <a:schemeClr val="accent1"/>
+          </a:effectRef>
+          <a:fontRef idx="minor">
+            <a:schemeClr val="lt1"/>
+          </a:fontRef>
+        </p:style>
+        <p:txBody>
+          <a:bodyPr rtlCol="0" anchor="ctr"/>
+          <a:lstStyle/>
+          <a:p>
+            <a:pPr algn="ctr"/>
+            <a:r>
+              <a:rPr lang="en-US" dirty="0"/>
+              <a:t>M</a:t>
+            </a:r>
+          </a:p>
+        </p:txBody>
+      </p:sp>
+      <p:sp>
+        <p:nvSpPr>
+          <p:cNvPr id="121" name="Rectangle 120">
+            <a:extLst>
+              <a:ext uri="{FF2B5EF4-FFF2-40B4-BE49-F238E27FC236}">
+                <a16:creationId xmlns:a16="http://schemas.microsoft.com/office/drawing/2014/main" id="{BABA1523-82B0-1249-8C4E-275AE12245AF}"/>
+              </a:ext>
+            </a:extLst>
+          </p:cNvPr>
+          <p:cNvSpPr/>
+          <p:nvPr/>
+        </p:nvSpPr>
+        <p:spPr>
+          <a:xfrm>
+            <a:off x="5110533" y="5078686"/>
+            <a:ext cx="358257" cy="280439"/>
+          </a:xfrm>
+          <a:prstGeom prst="rect">
+            <a:avLst/>
+          </a:prstGeom>
+          <a:solidFill>
+            <a:srgbClr val="7030A0"/>
+          </a:solidFill>
+          <a:ln>
+            <a:solidFill>
+              <a:schemeClr val="bg1"/>
+            </a:solidFill>
+          </a:ln>
+        </p:spPr>
+        <p:style>
+          <a:lnRef idx="2">
+            <a:schemeClr val="accent1">
+              <a:shade val="50000"/>
+            </a:schemeClr>
+          </a:lnRef>
+          <a:fillRef idx="1">
+            <a:schemeClr val="accent1"/>
+          </a:fillRef>
+          <a:effectRef idx="0">
+            <a:schemeClr val="accent1"/>
+          </a:effectRef>
+          <a:fontRef idx="minor">
+            <a:schemeClr val="lt1"/>
+          </a:fontRef>
+        </p:style>
+        <p:txBody>
+          <a:bodyPr rtlCol="0" anchor="ctr"/>
+          <a:lstStyle/>
+          <a:p>
+            <a:pPr algn="ctr"/>
+            <a:r>
+              <a:rPr lang="en-US" dirty="0"/>
+              <a:t>M</a:t>
+            </a:r>
+          </a:p>
+        </p:txBody>
+      </p:sp>
+      <p:sp>
+        <p:nvSpPr>
+          <p:cNvPr id="122" name="Rectangle 121">
+            <a:extLst>
+              <a:ext uri="{FF2B5EF4-FFF2-40B4-BE49-F238E27FC236}">
+                <a16:creationId xmlns:a16="http://schemas.microsoft.com/office/drawing/2014/main" id="{B8738215-D26F-4E45-BD14-F708664AB845}"/>
+              </a:ext>
+            </a:extLst>
+          </p:cNvPr>
+          <p:cNvSpPr/>
+          <p:nvPr/>
+        </p:nvSpPr>
+        <p:spPr>
+          <a:xfrm>
+            <a:off x="5686400" y="5078685"/>
+            <a:ext cx="358257" cy="280439"/>
+          </a:xfrm>
+          <a:prstGeom prst="rect">
+            <a:avLst/>
+          </a:prstGeom>
+          <a:solidFill>
+            <a:srgbClr val="7030A0"/>
+          </a:solidFill>
+          <a:ln>
+            <a:solidFill>
+              <a:schemeClr val="bg1"/>
+            </a:solidFill>
+          </a:ln>
+        </p:spPr>
+        <p:style>
+          <a:lnRef idx="2">
+            <a:schemeClr val="accent1">
+              <a:shade val="50000"/>
+            </a:schemeClr>
+          </a:lnRef>
+          <a:fillRef idx="1">
+            <a:schemeClr val="accent1"/>
+          </a:fillRef>
+          <a:effectRef idx="0">
+            <a:schemeClr val="accent1"/>
+          </a:effectRef>
+          <a:fontRef idx="minor">
+            <a:schemeClr val="lt1"/>
+          </a:fontRef>
+        </p:style>
+        <p:txBody>
+          <a:bodyPr rtlCol="0" anchor="ctr"/>
+          <a:lstStyle/>
+          <a:p>
+            <a:pPr algn="ctr"/>
+            <a:r>
+              <a:rPr lang="en-US" dirty="0"/>
+              <a:t>M</a:t>
+            </a:r>
+          </a:p>
+        </p:txBody>
+      </p:sp>
+      <p:sp>
+        <p:nvSpPr>
+          <p:cNvPr id="123" name="TextBox 122">
+            <a:extLst>
+              <a:ext uri="{FF2B5EF4-FFF2-40B4-BE49-F238E27FC236}">
+                <a16:creationId xmlns:a16="http://schemas.microsoft.com/office/drawing/2014/main" id="{9D93C267-3CA5-ED49-85F8-8368A7CFABF6}"/>
+              </a:ext>
+            </a:extLst>
+          </p:cNvPr>
+          <p:cNvSpPr txBox="1"/>
+          <p:nvPr/>
+        </p:nvSpPr>
+        <p:spPr>
+          <a:xfrm>
+            <a:off x="6123623" y="5001663"/>
+            <a:ext cx="343364" cy="369332"/>
+          </a:xfrm>
+          <a:prstGeom prst="rect">
+            <a:avLst/>
+          </a:prstGeom>
+          <a:noFill/>
+        </p:spPr>
+        <p:txBody>
+          <a:bodyPr wrap="none" rtlCol="0">
+            <a:spAutoFit/>
+          </a:bodyPr>
+          <a:lstStyle/>
+          <a:p>
+            <a:r>
+              <a:rPr lang="en-US" dirty="0"/>
+              <a:t>…</a:t>
+            </a:r>
+          </a:p>
+        </p:txBody>
+      </p:sp>
+      <p:sp>
+        <p:nvSpPr>
+          <p:cNvPr id="124" name="Rectangle 123">
+            <a:extLst>
+              <a:ext uri="{FF2B5EF4-FFF2-40B4-BE49-F238E27FC236}">
+                <a16:creationId xmlns:a16="http://schemas.microsoft.com/office/drawing/2014/main" id="{9F3756A2-AC83-FA4F-83C6-41A49FB68C04}"/>
+              </a:ext>
+            </a:extLst>
+          </p:cNvPr>
+          <p:cNvSpPr/>
+          <p:nvPr/>
+        </p:nvSpPr>
+        <p:spPr>
+          <a:xfrm>
+            <a:off x="6493827" y="5073542"/>
+            <a:ext cx="358257" cy="280439"/>
+          </a:xfrm>
+          <a:prstGeom prst="rect">
+            <a:avLst/>
+          </a:prstGeom>
+          <a:solidFill>
+            <a:srgbClr val="7030A0"/>
+          </a:solidFill>
+          <a:ln>
+            <a:solidFill>
+              <a:schemeClr val="bg1"/>
+            </a:solidFill>
+          </a:ln>
+        </p:spPr>
+        <p:style>
+          <a:lnRef idx="2">
+            <a:schemeClr val="accent1">
+              <a:shade val="50000"/>
+            </a:schemeClr>
+          </a:lnRef>
+          <a:fillRef idx="1">
+            <a:schemeClr val="accent1"/>
+          </a:fillRef>
+          <a:effectRef idx="0">
+            <a:schemeClr val="accent1"/>
+          </a:effectRef>
+          <a:fontRef idx="minor">
+            <a:schemeClr val="lt1"/>
+          </a:fontRef>
+        </p:style>
+        <p:txBody>
+          <a:bodyPr rtlCol="0" anchor="ctr"/>
+          <a:lstStyle/>
+          <a:p>
+            <a:pPr algn="ctr"/>
+            <a:r>
+              <a:rPr lang="en-US" dirty="0"/>
+              <a:t>M</a:t>
+            </a:r>
+          </a:p>
+        </p:txBody>
+      </p:sp>
+      <p:sp>
+        <p:nvSpPr>
+          <p:cNvPr id="125" name="Rectangle 124">
+            <a:extLst>
+              <a:ext uri="{FF2B5EF4-FFF2-40B4-BE49-F238E27FC236}">
+                <a16:creationId xmlns:a16="http://schemas.microsoft.com/office/drawing/2014/main" id="{08562B06-DBFE-254F-A314-B5E6EF426876}"/>
+              </a:ext>
+            </a:extLst>
+          </p:cNvPr>
+          <p:cNvSpPr/>
+          <p:nvPr/>
+        </p:nvSpPr>
+        <p:spPr>
+          <a:xfrm>
+            <a:off x="7046033" y="5072764"/>
+            <a:ext cx="358257" cy="280439"/>
+          </a:xfrm>
+          <a:prstGeom prst="rect">
+            <a:avLst/>
+          </a:prstGeom>
+          <a:solidFill>
+            <a:srgbClr val="7030A0"/>
+          </a:solidFill>
+          <a:ln>
+            <a:solidFill>
+              <a:schemeClr val="bg1"/>
+            </a:solidFill>
+          </a:ln>
+        </p:spPr>
+        <p:style>
+          <a:lnRef idx="2">
+            <a:schemeClr val="accent1">
+              <a:shade val="50000"/>
+            </a:schemeClr>
+          </a:lnRef>
+          <a:fillRef idx="1">
+            <a:schemeClr val="accent1"/>
+          </a:fillRef>
+          <a:effectRef idx="0">
+            <a:schemeClr val="accent1"/>
+          </a:effectRef>
+          <a:fontRef idx="minor">
+            <a:schemeClr val="lt1"/>
+          </a:fontRef>
+        </p:style>
+        <p:txBody>
+          <a:bodyPr rtlCol="0" anchor="ctr"/>
+          <a:lstStyle/>
+          <a:p>
+            <a:pPr algn="ctr"/>
+            <a:r>
+              <a:rPr lang="en-US" dirty="0"/>
+              <a:t>M</a:t>
+            </a:r>
+          </a:p>
+        </p:txBody>
+      </p:sp>
+      <p:sp>
+        <p:nvSpPr>
+          <p:cNvPr id="126" name="Rectangle 125">
+            <a:extLst>
+              <a:ext uri="{FF2B5EF4-FFF2-40B4-BE49-F238E27FC236}">
+                <a16:creationId xmlns:a16="http://schemas.microsoft.com/office/drawing/2014/main" id="{925D45A0-B6F1-4C4B-B4C1-EE9B9B6278DD}"/>
+              </a:ext>
+            </a:extLst>
+          </p:cNvPr>
+          <p:cNvSpPr/>
+          <p:nvPr/>
+        </p:nvSpPr>
+        <p:spPr>
+          <a:xfrm>
+            <a:off x="4124153" y="5455727"/>
+            <a:ext cx="3696715" cy="283572"/>
+          </a:xfrm>
+          <a:prstGeom prst="rect">
+            <a:avLst/>
+          </a:prstGeom>
+        </p:spPr>
+        <p:style>
+          <a:lnRef idx="2">
+            <a:schemeClr val="accent1">
+              <a:shade val="50000"/>
+            </a:schemeClr>
+          </a:lnRef>
+          <a:fillRef idx="1">
+            <a:schemeClr val="accent1"/>
+          </a:fillRef>
+          <a:effectRef idx="0">
+            <a:schemeClr val="accent1"/>
+          </a:effectRef>
+          <a:fontRef idx="minor">
+            <a:schemeClr val="lt1"/>
+          </a:fontRef>
+        </p:style>
+        <p:txBody>
+          <a:bodyPr rtlCol="0" anchor="ctr"/>
+          <a:lstStyle/>
+          <a:p>
+            <a:pPr algn="ctr"/>
+            <a:r>
+              <a:rPr lang="en-US" dirty="0"/>
+              <a:t>OS Scheduler</a:t>
+            </a:r>
+          </a:p>
+        </p:txBody>
+      </p:sp>
+      <p:sp>
+        <p:nvSpPr>
+          <p:cNvPr id="127" name="Oval 126">
+            <a:extLst>
+              <a:ext uri="{FF2B5EF4-FFF2-40B4-BE49-F238E27FC236}">
+                <a16:creationId xmlns:a16="http://schemas.microsoft.com/office/drawing/2014/main" id="{70CE80F3-DCFA-B94C-B36A-D6B7BD33D9CA}"/>
+              </a:ext>
+            </a:extLst>
+          </p:cNvPr>
+          <p:cNvSpPr/>
+          <p:nvPr/>
+        </p:nvSpPr>
+        <p:spPr>
+          <a:xfrm>
+            <a:off x="10069161" y="4785175"/>
+            <a:ext cx="357002" cy="328629"/>
+          </a:xfrm>
+          <a:prstGeom prst="ellipse">
+            <a:avLst/>
+          </a:prstGeom>
+          <a:solidFill>
+            <a:srgbClr val="FFFF00"/>
+          </a:solidFill>
+        </p:spPr>
+        <p:style>
+          <a:lnRef idx="2">
+            <a:schemeClr val="accent1">
+              <a:shade val="50000"/>
+            </a:schemeClr>
+          </a:lnRef>
+          <a:fillRef idx="1">
+            <a:schemeClr val="accent1"/>
+          </a:fillRef>
+          <a:effectRef idx="0">
+            <a:schemeClr val="accent1"/>
+          </a:effectRef>
+          <a:fontRef idx="minor">
+            <a:schemeClr val="lt1"/>
+          </a:fontRef>
+        </p:style>
+        <p:txBody>
+          <a:bodyPr rtlCol="0" anchor="ctr"/>
+          <a:lstStyle/>
+          <a:p>
+            <a:pPr algn="ctr"/>
+            <a:r>
+              <a:rPr lang="en-US" dirty="0">
+                <a:solidFill>
+                  <a:schemeClr val="bg1"/>
+                </a:solidFill>
+              </a:rPr>
+              <a:t>G</a:t>
+            </a:r>
+          </a:p>
+        </p:txBody>
+      </p:sp>
+      <p:sp>
+        <p:nvSpPr>
+          <p:cNvPr id="128" name="TextBox 127">
+            <a:extLst>
+              <a:ext uri="{FF2B5EF4-FFF2-40B4-BE49-F238E27FC236}">
+                <a16:creationId xmlns:a16="http://schemas.microsoft.com/office/drawing/2014/main" id="{0A2EC62C-8F91-4A43-8DA8-D328B1A57BCC}"/>
+              </a:ext>
+            </a:extLst>
+          </p:cNvPr>
+          <p:cNvSpPr txBox="1"/>
+          <p:nvPr/>
+        </p:nvSpPr>
+        <p:spPr>
+          <a:xfrm>
+            <a:off x="10426163" y="4764823"/>
+            <a:ext cx="1139543" cy="369332"/>
+          </a:xfrm>
+          <a:prstGeom prst="rect">
+            <a:avLst/>
+          </a:prstGeom>
+          <a:noFill/>
+        </p:spPr>
+        <p:txBody>
+          <a:bodyPr wrap="none" rtlCol="0">
+            <a:spAutoFit/>
+          </a:bodyPr>
+          <a:lstStyle/>
+          <a:p>
+            <a:r>
+              <a:rPr lang="en-US" dirty="0"/>
+              <a:t>Goroutine</a:t>
+            </a:r>
+          </a:p>
+        </p:txBody>
+      </p:sp>
+      <p:sp>
+        <p:nvSpPr>
+          <p:cNvPr id="129" name="Rectangle 128">
+            <a:extLst>
+              <a:ext uri="{FF2B5EF4-FFF2-40B4-BE49-F238E27FC236}">
+                <a16:creationId xmlns:a16="http://schemas.microsoft.com/office/drawing/2014/main" id="{5AF937F0-0104-5647-B1CB-3D9ED2FCD30A}"/>
+              </a:ext>
+            </a:extLst>
+          </p:cNvPr>
+          <p:cNvSpPr/>
+          <p:nvPr/>
+        </p:nvSpPr>
+        <p:spPr>
+          <a:xfrm>
+            <a:off x="10069161" y="5313191"/>
+            <a:ext cx="384207" cy="338319"/>
+          </a:xfrm>
+          <a:prstGeom prst="rect">
+            <a:avLst/>
+          </a:prstGeom>
+          <a:solidFill>
+            <a:srgbClr val="FF0000"/>
+          </a:solidFill>
+          <a:ln>
+            <a:solidFill>
+              <a:schemeClr val="bg1"/>
+            </a:solidFill>
+          </a:ln>
+        </p:spPr>
+        <p:style>
+          <a:lnRef idx="2">
+            <a:schemeClr val="accent1">
+              <a:shade val="50000"/>
+            </a:schemeClr>
+          </a:lnRef>
+          <a:fillRef idx="1">
+            <a:schemeClr val="accent1"/>
+          </a:fillRef>
+          <a:effectRef idx="0">
+            <a:schemeClr val="accent1"/>
+          </a:effectRef>
+          <a:fontRef idx="minor">
+            <a:schemeClr val="lt1"/>
+          </a:fontRef>
+        </p:style>
+        <p:txBody>
+          <a:bodyPr rtlCol="0" anchor="ctr"/>
+          <a:lstStyle/>
+          <a:p>
+            <a:pPr algn="ctr"/>
+            <a:r>
+              <a:rPr lang="en-US" dirty="0"/>
+              <a:t>P</a:t>
+            </a:r>
+          </a:p>
+        </p:txBody>
+      </p:sp>
+      <p:sp>
+        <p:nvSpPr>
+          <p:cNvPr id="130" name="TextBox 129">
+            <a:extLst>
+              <a:ext uri="{FF2B5EF4-FFF2-40B4-BE49-F238E27FC236}">
+                <a16:creationId xmlns:a16="http://schemas.microsoft.com/office/drawing/2014/main" id="{DA5DCE1E-20FA-D543-84E7-829F57001EDB}"/>
+              </a:ext>
+            </a:extLst>
+          </p:cNvPr>
+          <p:cNvSpPr txBox="1"/>
+          <p:nvPr/>
+        </p:nvSpPr>
+        <p:spPr>
+          <a:xfrm>
+            <a:off x="10426163" y="5282178"/>
+            <a:ext cx="1577163" cy="369332"/>
+          </a:xfrm>
+          <a:prstGeom prst="rect">
+            <a:avLst/>
+          </a:prstGeom>
+          <a:noFill/>
+        </p:spPr>
+        <p:txBody>
+          <a:bodyPr wrap="none" rtlCol="0">
+            <a:spAutoFit/>
+          </a:bodyPr>
+          <a:lstStyle/>
+          <a:p>
+            <a:r>
+              <a:rPr lang="en-US" dirty="0"/>
+              <a:t>Process Queue</a:t>
+            </a:r>
+          </a:p>
+        </p:txBody>
+      </p:sp>
+      <p:sp>
+        <p:nvSpPr>
+          <p:cNvPr id="132" name="Rectangle 131">
+            <a:extLst>
+              <a:ext uri="{FF2B5EF4-FFF2-40B4-BE49-F238E27FC236}">
+                <a16:creationId xmlns:a16="http://schemas.microsoft.com/office/drawing/2014/main" id="{560DCDE5-0532-8C40-933D-BBBA0F439250}"/>
+              </a:ext>
+            </a:extLst>
+          </p:cNvPr>
+          <p:cNvSpPr/>
+          <p:nvPr/>
+        </p:nvSpPr>
+        <p:spPr>
+          <a:xfrm>
+            <a:off x="10082135" y="5889330"/>
+            <a:ext cx="358257" cy="280439"/>
+          </a:xfrm>
+          <a:prstGeom prst="rect">
+            <a:avLst/>
+          </a:prstGeom>
+          <a:solidFill>
+            <a:srgbClr val="7030A0"/>
+          </a:solidFill>
+          <a:ln>
+            <a:solidFill>
+              <a:schemeClr val="bg1"/>
+            </a:solidFill>
+          </a:ln>
+        </p:spPr>
+        <p:style>
+          <a:lnRef idx="2">
+            <a:schemeClr val="accent1">
+              <a:shade val="50000"/>
+            </a:schemeClr>
+          </a:lnRef>
+          <a:fillRef idx="1">
+            <a:schemeClr val="accent1"/>
+          </a:fillRef>
+          <a:effectRef idx="0">
+            <a:schemeClr val="accent1"/>
+          </a:effectRef>
+          <a:fontRef idx="minor">
+            <a:schemeClr val="lt1"/>
+          </a:fontRef>
+        </p:style>
+        <p:txBody>
+          <a:bodyPr rtlCol="0" anchor="ctr"/>
+          <a:lstStyle/>
+          <a:p>
+            <a:pPr algn="ctr"/>
+            <a:r>
+              <a:rPr lang="en-US" dirty="0"/>
+              <a:t>M</a:t>
+            </a:r>
+          </a:p>
+        </p:txBody>
+      </p:sp>
+      <p:sp>
+        <p:nvSpPr>
+          <p:cNvPr id="133" name="TextBox 132">
+            <a:extLst>
+              <a:ext uri="{FF2B5EF4-FFF2-40B4-BE49-F238E27FC236}">
+                <a16:creationId xmlns:a16="http://schemas.microsoft.com/office/drawing/2014/main" id="{57DF0F62-7A0D-E145-B517-86E27A4633FA}"/>
+              </a:ext>
+            </a:extLst>
+          </p:cNvPr>
+          <p:cNvSpPr txBox="1"/>
+          <p:nvPr/>
+        </p:nvSpPr>
+        <p:spPr>
+          <a:xfrm>
+            <a:off x="10453368" y="5831403"/>
+            <a:ext cx="1391278" cy="369332"/>
+          </a:xfrm>
+          <a:prstGeom prst="rect">
+            <a:avLst/>
+          </a:prstGeom>
+          <a:noFill/>
+        </p:spPr>
+        <p:txBody>
+          <a:bodyPr wrap="none" rtlCol="0">
+            <a:spAutoFit/>
+          </a:bodyPr>
+          <a:lstStyle/>
+          <a:p>
+            <a:r>
+              <a:rPr lang="en-US" dirty="0"/>
+              <a:t>Machine KSE</a:t>
+            </a:r>
+          </a:p>
+        </p:txBody>
+      </p:sp>
+      <p:sp>
+        <p:nvSpPr>
+          <p:cNvPr id="134" name="Rectangle 133">
+            <a:extLst>
+              <a:ext uri="{FF2B5EF4-FFF2-40B4-BE49-F238E27FC236}">
+                <a16:creationId xmlns:a16="http://schemas.microsoft.com/office/drawing/2014/main" id="{28DBBD1D-2B1C-0C41-B64C-3839868C1724}"/>
+              </a:ext>
+            </a:extLst>
+          </p:cNvPr>
+          <p:cNvSpPr/>
+          <p:nvPr/>
+        </p:nvSpPr>
+        <p:spPr>
+          <a:xfrm>
+            <a:off x="2226103" y="2578046"/>
+            <a:ext cx="1166636" cy="707886"/>
+          </a:xfrm>
+          <a:prstGeom prst="rect">
+            <a:avLst/>
+          </a:prstGeom>
+          <a:solidFill>
+            <a:schemeClr val="accent2"/>
+          </a:solidFill>
+          <a:ln>
+            <a:solidFill>
+              <a:schemeClr val="bg1"/>
+            </a:solidFill>
+          </a:ln>
+        </p:spPr>
+        <p:style>
+          <a:lnRef idx="2">
+            <a:schemeClr val="accent1">
+              <a:shade val="50000"/>
+            </a:schemeClr>
+          </a:lnRef>
+          <a:fillRef idx="1">
+            <a:schemeClr val="accent1"/>
+          </a:fillRef>
+          <a:effectRef idx="0">
+            <a:schemeClr val="accent1"/>
+          </a:effectRef>
+          <a:fontRef idx="minor">
+            <a:schemeClr val="lt1"/>
+          </a:fontRef>
+        </p:style>
+        <p:txBody>
+          <a:bodyPr rtlCol="0" anchor="ctr"/>
+          <a:lstStyle/>
+          <a:p>
+            <a:pPr algn="ctr"/>
+            <a:r>
+              <a:rPr lang="en-US" sz="1400" b="1" dirty="0">
+                <a:solidFill>
+                  <a:schemeClr val="bg1"/>
+                </a:solidFill>
+              </a:rPr>
+              <a:t>User Space</a:t>
+            </a:r>
+          </a:p>
+        </p:txBody>
+      </p:sp>
+      <p:sp>
+        <p:nvSpPr>
+          <p:cNvPr id="135" name="Rectangle 134">
+            <a:extLst>
+              <a:ext uri="{FF2B5EF4-FFF2-40B4-BE49-F238E27FC236}">
+                <a16:creationId xmlns:a16="http://schemas.microsoft.com/office/drawing/2014/main" id="{980CA437-A4C8-4E4F-8FAD-A24DF66D5D9C}"/>
+              </a:ext>
+            </a:extLst>
+          </p:cNvPr>
+          <p:cNvSpPr/>
+          <p:nvPr/>
+        </p:nvSpPr>
+        <p:spPr>
+          <a:xfrm>
+            <a:off x="4521991" y="6161595"/>
+            <a:ext cx="343955" cy="282223"/>
+          </a:xfrm>
+          <a:prstGeom prst="rect">
+            <a:avLst/>
+          </a:prstGeom>
+          <a:solidFill>
+            <a:schemeClr val="tx1"/>
+          </a:solidFill>
+        </p:spPr>
+        <p:style>
+          <a:lnRef idx="2">
+            <a:schemeClr val="accent1">
+              <a:shade val="50000"/>
+            </a:schemeClr>
+          </a:lnRef>
+          <a:fillRef idx="1">
+            <a:schemeClr val="accent1"/>
+          </a:fillRef>
+          <a:effectRef idx="0">
+            <a:schemeClr val="accent1"/>
+          </a:effectRef>
+          <a:fontRef idx="minor">
+            <a:schemeClr val="lt1"/>
+          </a:fontRef>
+        </p:style>
+        <p:txBody>
+          <a:bodyPr rtlCol="0" anchor="ctr"/>
+          <a:lstStyle/>
+          <a:p>
+            <a:pPr algn="ctr"/>
+            <a:r>
+              <a:rPr lang="en-US" dirty="0">
+                <a:solidFill>
+                  <a:schemeClr val="bg1"/>
+                </a:solidFill>
+              </a:rPr>
+              <a:t>C</a:t>
+            </a:r>
+          </a:p>
+        </p:txBody>
+      </p:sp>
+      <p:sp>
+        <p:nvSpPr>
+          <p:cNvPr id="136" name="Rectangle 135">
+            <a:extLst>
+              <a:ext uri="{FF2B5EF4-FFF2-40B4-BE49-F238E27FC236}">
+                <a16:creationId xmlns:a16="http://schemas.microsoft.com/office/drawing/2014/main" id="{7FEB2BAD-9F81-8E40-8D91-963A2D22C5F6}"/>
+              </a:ext>
+            </a:extLst>
+          </p:cNvPr>
+          <p:cNvSpPr/>
+          <p:nvPr/>
+        </p:nvSpPr>
+        <p:spPr>
+          <a:xfrm>
+            <a:off x="5095627" y="6156318"/>
+            <a:ext cx="343955" cy="282223"/>
+          </a:xfrm>
+          <a:prstGeom prst="rect">
+            <a:avLst/>
+          </a:prstGeom>
+          <a:solidFill>
+            <a:schemeClr val="tx1"/>
+          </a:solidFill>
+        </p:spPr>
+        <p:style>
+          <a:lnRef idx="2">
+            <a:schemeClr val="accent1">
+              <a:shade val="50000"/>
+            </a:schemeClr>
+          </a:lnRef>
+          <a:fillRef idx="1">
+            <a:schemeClr val="accent1"/>
+          </a:fillRef>
+          <a:effectRef idx="0">
+            <a:schemeClr val="accent1"/>
+          </a:effectRef>
+          <a:fontRef idx="minor">
+            <a:schemeClr val="lt1"/>
+          </a:fontRef>
+        </p:style>
+        <p:txBody>
+          <a:bodyPr rtlCol="0" anchor="ctr"/>
+          <a:lstStyle/>
+          <a:p>
+            <a:pPr algn="ctr"/>
+            <a:r>
+              <a:rPr lang="en-US" dirty="0">
+                <a:solidFill>
+                  <a:schemeClr val="bg1"/>
+                </a:solidFill>
+              </a:rPr>
+              <a:t>C</a:t>
+            </a:r>
+          </a:p>
+        </p:txBody>
+      </p:sp>
+      <p:sp>
+        <p:nvSpPr>
+          <p:cNvPr id="137" name="Rectangle 136">
+            <a:extLst>
+              <a:ext uri="{FF2B5EF4-FFF2-40B4-BE49-F238E27FC236}">
+                <a16:creationId xmlns:a16="http://schemas.microsoft.com/office/drawing/2014/main" id="{E3728545-6BB3-5F41-8DF6-06684C6620C3}"/>
+              </a:ext>
+            </a:extLst>
+          </p:cNvPr>
+          <p:cNvSpPr/>
+          <p:nvPr/>
+        </p:nvSpPr>
+        <p:spPr>
+          <a:xfrm>
+            <a:off x="5684919" y="6156318"/>
+            <a:ext cx="343955" cy="282223"/>
+          </a:xfrm>
+          <a:prstGeom prst="rect">
+            <a:avLst/>
+          </a:prstGeom>
+          <a:solidFill>
+            <a:schemeClr val="tx1"/>
+          </a:solidFill>
+        </p:spPr>
+        <p:style>
+          <a:lnRef idx="2">
+            <a:schemeClr val="accent1">
+              <a:shade val="50000"/>
+            </a:schemeClr>
+          </a:lnRef>
+          <a:fillRef idx="1">
+            <a:schemeClr val="accent1"/>
+          </a:fillRef>
+          <a:effectRef idx="0">
+            <a:schemeClr val="accent1"/>
+          </a:effectRef>
+          <a:fontRef idx="minor">
+            <a:schemeClr val="lt1"/>
+          </a:fontRef>
+        </p:style>
+        <p:txBody>
+          <a:bodyPr rtlCol="0" anchor="ctr"/>
+          <a:lstStyle/>
+          <a:p>
+            <a:pPr algn="ctr"/>
+            <a:r>
+              <a:rPr lang="en-US" dirty="0">
+                <a:solidFill>
+                  <a:schemeClr val="bg1"/>
+                </a:solidFill>
+              </a:rPr>
+              <a:t>C</a:t>
+            </a:r>
+          </a:p>
+        </p:txBody>
+      </p:sp>
+      <p:sp>
+        <p:nvSpPr>
+          <p:cNvPr id="138" name="TextBox 137">
+            <a:extLst>
+              <a:ext uri="{FF2B5EF4-FFF2-40B4-BE49-F238E27FC236}">
+                <a16:creationId xmlns:a16="http://schemas.microsoft.com/office/drawing/2014/main" id="{3804153C-C47C-7944-92D8-DE5B4A7BA80D}"/>
+              </a:ext>
+            </a:extLst>
+          </p:cNvPr>
+          <p:cNvSpPr txBox="1"/>
+          <p:nvPr/>
+        </p:nvSpPr>
+        <p:spPr>
+          <a:xfrm>
+            <a:off x="6116447" y="6046472"/>
+            <a:ext cx="343364" cy="369332"/>
+          </a:xfrm>
+          <a:prstGeom prst="rect">
+            <a:avLst/>
+          </a:prstGeom>
+          <a:noFill/>
+        </p:spPr>
+        <p:txBody>
+          <a:bodyPr wrap="none" rtlCol="0">
+            <a:spAutoFit/>
+          </a:bodyPr>
+          <a:lstStyle/>
+          <a:p>
+            <a:r>
+              <a:rPr lang="en-US" dirty="0"/>
+              <a:t>…</a:t>
+            </a:r>
+          </a:p>
+        </p:txBody>
+      </p:sp>
+      <p:sp>
+        <p:nvSpPr>
+          <p:cNvPr id="139" name="Rectangle 138">
+            <a:extLst>
+              <a:ext uri="{FF2B5EF4-FFF2-40B4-BE49-F238E27FC236}">
+                <a16:creationId xmlns:a16="http://schemas.microsoft.com/office/drawing/2014/main" id="{0DB4A046-6B77-CB4E-8521-A359C7F232C8}"/>
+              </a:ext>
+            </a:extLst>
+          </p:cNvPr>
+          <p:cNvSpPr/>
+          <p:nvPr/>
+        </p:nvSpPr>
+        <p:spPr>
+          <a:xfrm>
+            <a:off x="6508129" y="6156236"/>
+            <a:ext cx="343955" cy="282223"/>
+          </a:xfrm>
+          <a:prstGeom prst="rect">
+            <a:avLst/>
+          </a:prstGeom>
+          <a:solidFill>
+            <a:schemeClr val="tx1"/>
+          </a:solidFill>
+        </p:spPr>
+        <p:style>
+          <a:lnRef idx="2">
+            <a:schemeClr val="accent1">
+              <a:shade val="50000"/>
+            </a:schemeClr>
+          </a:lnRef>
+          <a:fillRef idx="1">
+            <a:schemeClr val="accent1"/>
+          </a:fillRef>
+          <a:effectRef idx="0">
+            <a:schemeClr val="accent1"/>
+          </a:effectRef>
+          <a:fontRef idx="minor">
+            <a:schemeClr val="lt1"/>
+          </a:fontRef>
+        </p:style>
+        <p:txBody>
+          <a:bodyPr rtlCol="0" anchor="ctr"/>
+          <a:lstStyle/>
+          <a:p>
+            <a:pPr algn="ctr"/>
+            <a:r>
+              <a:rPr lang="en-US" dirty="0">
+                <a:solidFill>
+                  <a:schemeClr val="bg1"/>
+                </a:solidFill>
+              </a:rPr>
+              <a:t>C</a:t>
+            </a:r>
+          </a:p>
+        </p:txBody>
+      </p:sp>
+      <p:sp>
+        <p:nvSpPr>
+          <p:cNvPr id="140" name="Rectangle 139">
+            <a:extLst>
+              <a:ext uri="{FF2B5EF4-FFF2-40B4-BE49-F238E27FC236}">
+                <a16:creationId xmlns:a16="http://schemas.microsoft.com/office/drawing/2014/main" id="{EC370521-43FD-5342-9494-1D44F843FBAB}"/>
+              </a:ext>
+            </a:extLst>
+          </p:cNvPr>
+          <p:cNvSpPr/>
+          <p:nvPr/>
+        </p:nvSpPr>
+        <p:spPr>
+          <a:xfrm>
+            <a:off x="7046033" y="6160230"/>
+            <a:ext cx="343955" cy="282223"/>
+          </a:xfrm>
+          <a:prstGeom prst="rect">
+            <a:avLst/>
+          </a:prstGeom>
+          <a:solidFill>
+            <a:schemeClr val="tx1"/>
+          </a:solidFill>
+        </p:spPr>
+        <p:style>
+          <a:lnRef idx="2">
+            <a:schemeClr val="accent1">
+              <a:shade val="50000"/>
+            </a:schemeClr>
+          </a:lnRef>
+          <a:fillRef idx="1">
+            <a:schemeClr val="accent1"/>
+          </a:fillRef>
+          <a:effectRef idx="0">
+            <a:schemeClr val="accent1"/>
+          </a:effectRef>
+          <a:fontRef idx="minor">
+            <a:schemeClr val="lt1"/>
+          </a:fontRef>
+        </p:style>
+        <p:txBody>
+          <a:bodyPr rtlCol="0" anchor="ctr"/>
+          <a:lstStyle/>
+          <a:p>
+            <a:pPr algn="ctr"/>
+            <a:r>
+              <a:rPr lang="en-US" dirty="0">
+                <a:solidFill>
+                  <a:schemeClr val="bg1"/>
+                </a:solidFill>
+              </a:rPr>
+              <a:t>C</a:t>
+            </a:r>
+          </a:p>
+        </p:txBody>
+      </p:sp>
+      <p:sp>
+        <p:nvSpPr>
+          <p:cNvPr id="147" name="Rectangle 146">
+            <a:extLst>
+              <a:ext uri="{FF2B5EF4-FFF2-40B4-BE49-F238E27FC236}">
+                <a16:creationId xmlns:a16="http://schemas.microsoft.com/office/drawing/2014/main" id="{26D59CB3-A19D-BF4B-A3FC-CABF67F900CA}"/>
+              </a:ext>
+            </a:extLst>
+          </p:cNvPr>
+          <p:cNvSpPr/>
+          <p:nvPr/>
+        </p:nvSpPr>
+        <p:spPr>
+          <a:xfrm>
+            <a:off x="10089285" y="6393783"/>
+            <a:ext cx="343955" cy="282223"/>
+          </a:xfrm>
+          <a:prstGeom prst="rect">
+            <a:avLst/>
+          </a:prstGeom>
+          <a:solidFill>
+            <a:schemeClr val="tx1"/>
+          </a:solidFill>
+        </p:spPr>
+        <p:style>
+          <a:lnRef idx="2">
+            <a:schemeClr val="accent1">
+              <a:shade val="50000"/>
+            </a:schemeClr>
+          </a:lnRef>
+          <a:fillRef idx="1">
+            <a:schemeClr val="accent1"/>
+          </a:fillRef>
+          <a:effectRef idx="0">
+            <a:schemeClr val="accent1"/>
+          </a:effectRef>
+          <a:fontRef idx="minor">
+            <a:schemeClr val="lt1"/>
+          </a:fontRef>
+        </p:style>
+        <p:txBody>
+          <a:bodyPr rtlCol="0" anchor="ctr"/>
+          <a:lstStyle/>
+          <a:p>
+            <a:pPr algn="ctr"/>
+            <a:r>
+              <a:rPr lang="en-US" dirty="0">
+                <a:solidFill>
+                  <a:schemeClr val="bg1"/>
+                </a:solidFill>
+              </a:rPr>
+              <a:t>C</a:t>
+            </a:r>
+          </a:p>
+        </p:txBody>
+      </p:sp>
+      <p:sp>
+        <p:nvSpPr>
+          <p:cNvPr id="148" name="TextBox 147">
+            <a:extLst>
+              <a:ext uri="{FF2B5EF4-FFF2-40B4-BE49-F238E27FC236}">
+                <a16:creationId xmlns:a16="http://schemas.microsoft.com/office/drawing/2014/main" id="{8FDC4281-14E4-2B42-B3DE-97E848BAEC42}"/>
+              </a:ext>
+            </a:extLst>
+          </p:cNvPr>
+          <p:cNvSpPr txBox="1"/>
+          <p:nvPr/>
+        </p:nvSpPr>
+        <p:spPr>
+          <a:xfrm>
+            <a:off x="10453368" y="6350228"/>
+            <a:ext cx="1064907" cy="369332"/>
+          </a:xfrm>
+          <a:prstGeom prst="rect">
+            <a:avLst/>
+          </a:prstGeom>
+          <a:noFill/>
+        </p:spPr>
+        <p:txBody>
+          <a:bodyPr wrap="none" rtlCol="0">
+            <a:spAutoFit/>
+          </a:bodyPr>
+          <a:lstStyle/>
+          <a:p>
+            <a:r>
+              <a:rPr lang="en-US" dirty="0"/>
+              <a:t>CPU Core</a:t>
+            </a:r>
+          </a:p>
+        </p:txBody>
+      </p:sp>
+    </p:spTree>
+    <p:extLst>
+      <p:ext uri="{BB962C8B-B14F-4D97-AF65-F5344CB8AC3E}">
+        <p14:creationId xmlns:p14="http://schemas.microsoft.com/office/powerpoint/2010/main" val="1485926822"/>
+      </p:ext>
+    </p:extLst>
+  </p:cSld>
+  <p:clrMapOvr>
+    <a:masterClrMapping/>
+  </p:clrMapOvr>
+</p:sld>
+</file>
+
+<file path=ppt/slides/slide4.xml><?xml version="1.0" encoding="utf-8"?>
+<p:sld xmlns:a="http://schemas.openxmlformats.org/drawingml/2006/main" xmlns:r="http://schemas.openxmlformats.org/officeDocument/2006/relationships" xmlns:p="http://schemas.openxmlformats.org/presentationml/2006/main">
+  <p:cSld>
+    <p:spTree>
+      <p:nvGrpSpPr>
+        <p:cNvPr id="1" name=""/>
+        <p:cNvGrpSpPr/>
+        <p:nvPr/>
+      </p:nvGrpSpPr>
+      <p:grpSpPr>
+        <a:xfrm>
+          <a:off x="0" y="0"/>
+          <a:ext cx="0" cy="0"/>
+          <a:chOff x="0" y="0"/>
+          <a:chExt cx="0" cy="0"/>
+        </a:xfrm>
+      </p:grpSpPr>
+      <p:sp>
+        <p:nvSpPr>
+          <p:cNvPr id="2" name="TextBox 1">
+            <a:extLst>
+              <a:ext uri="{FF2B5EF4-FFF2-40B4-BE49-F238E27FC236}">
+                <a16:creationId xmlns:a16="http://schemas.microsoft.com/office/drawing/2014/main" id="{F0A24B46-B288-CA48-978C-76B900D1DA63}"/>
+              </a:ext>
+            </a:extLst>
+          </p:cNvPr>
+          <p:cNvSpPr txBox="1"/>
+          <p:nvPr/>
+        </p:nvSpPr>
+        <p:spPr>
+          <a:xfrm>
+            <a:off x="1872533" y="123995"/>
+            <a:ext cx="8446926" cy="707886"/>
+          </a:xfrm>
+          <a:prstGeom prst="rect">
+            <a:avLst/>
+          </a:prstGeom>
+          <a:noFill/>
+        </p:spPr>
+        <p:txBody>
+          <a:bodyPr wrap="square" rtlCol="0">
+            <a:spAutoFit/>
+          </a:bodyPr>
+          <a:lstStyle/>
+          <a:p>
+            <a:pPr algn="ctr"/>
+            <a:r>
+              <a:rPr lang="en-US" sz="4000" dirty="0">
+                <a:solidFill>
+                  <a:schemeClr val="accent1">
+                    <a:lumMod val="60000"/>
+                    <a:lumOff val="40000"/>
+                  </a:schemeClr>
+                </a:solidFill>
+              </a:rPr>
+              <a:t>Abstractions</a:t>
+            </a:r>
+          </a:p>
+        </p:txBody>
+      </p:sp>
+    </p:spTree>
+    <p:extLst>
+      <p:ext uri="{BB962C8B-B14F-4D97-AF65-F5344CB8AC3E}">
+        <p14:creationId xmlns:p14="http://schemas.microsoft.com/office/powerpoint/2010/main" val="1676827133"/>
       </p:ext>
     </p:extLst>
   </p:cSld>

</xml_diff>